<commit_message>
correction to L05/06, and new lectures
</commit_message>
<xml_diff>
--- a/Slides-RPR/2019-H1-DAA-L04-Algo-Specs-Analysis.pptx
+++ b/Slides-RPR/2019-H1-DAA-L04-Algo-Specs-Analysis.pptx
@@ -3820,7 +3820,7 @@
           <a:p>
             <a:pPr lvl="2"/>
             <a:r>
-              <a:t>Sort collection of n unsorted elements. Find the shortest element and place it ahead of sorted list.</a:t>
+              <a:t>To sort collection of n unsorted elements, find the shortest element and place it ahead of sorted list.</a:t>
             </a:r>
           </a:p>
           <a:p>
@@ -3832,7 +3832,7 @@
           <a:p>
             <a:pPr lvl="2"/>
             <a:r>
-              <a:t>How are the elements initially stored?</a:t>
+              <a:t>How are the elements initially stored in a collection?</a:t>
             </a:r>
           </a:p>
           <a:p>
@@ -4572,10 +4572,13 @@
             </a:r>
           </a:p>
           <a:p>
-            <a:pPr lvl="1" marL="0" indent="228600">
+            <a:pPr lvl="2" marL="0" indent="457200">
+              <a:spcBef>
+                <a:spcPts val="600"/>
+              </a:spcBef>
               <a:buSzTx/>
               <a:buNone/>
-              <a:defRPr sz="2800">
+              <a:defRPr i="1">
                 <a:latin typeface="Courier New"/>
                 <a:ea typeface="Courier New"/>
                 <a:cs typeface="Courier New"/>
@@ -4583,17 +4586,47 @@
               </a:defRPr>
             </a:pPr>
             <a:r>
-              <a:t>for i=1 to n do</a:t>
-            </a:r>
-          </a:p>
-          <a:p>
-            <a:pPr lvl="2" marL="0" indent="457200">
+              <a:rPr>
+                <a:latin typeface="+mn-lt"/>
+                <a:ea typeface="+mn-ea"/>
+                <a:cs typeface="+mn-cs"/>
+                <a:sym typeface="Gill Sans"/>
+              </a:rPr>
+              <a:t>for</a:t>
+            </a:r>
+            <a:r>
+              <a:t> i=1 </a:t>
+            </a:r>
+            <a:r>
+              <a:rPr>
+                <a:latin typeface="+mn-lt"/>
+                <a:ea typeface="+mn-ea"/>
+                <a:cs typeface="+mn-cs"/>
+                <a:sym typeface="Gill Sans"/>
+              </a:rPr>
+              <a:t>to</a:t>
+            </a:r>
+            <a:r>
+              <a:t> n </a:t>
+            </a:r>
+            <a:r>
+              <a:rPr>
+                <a:latin typeface="+mn-lt"/>
+                <a:ea typeface="+mn-ea"/>
+                <a:cs typeface="+mn-cs"/>
+                <a:sym typeface="Gill Sans"/>
+              </a:rPr>
+              <a:t>do</a:t>
+            </a:r>
+          </a:p>
+          <a:p>
+            <a:pPr lvl="3" marL="0" indent="685800">
               <a:spcBef>
                 <a:spcPts val="600"/>
               </a:spcBef>
               <a:buSzTx/>
               <a:buNone/>
-              <a:defRPr>
+              <a:defRPr i="1">
                 <a:latin typeface="Courier New"/>
                 <a:ea typeface="Courier New"/>
                 <a:cs typeface="Courier New"/>
@@ -4601,17 +4634,47 @@
               </a:defRPr>
             </a:pPr>
             <a:r>
-              <a:t>examine a[i] to a[n], and</a:t>
-            </a:r>
-          </a:p>
-          <a:p>
-            <a:pPr lvl="2" marL="0" indent="457200">
+              <a:rPr>
+                <a:latin typeface="+mn-lt"/>
+                <a:ea typeface="+mn-ea"/>
+                <a:cs typeface="+mn-cs"/>
+                <a:sym typeface="Gill Sans"/>
+              </a:rPr>
+              <a:t>examine</a:t>
+            </a:r>
+            <a:r>
+              <a:t> a[i] </a:t>
+            </a:r>
+            <a:r>
+              <a:rPr>
+                <a:latin typeface="+mn-lt"/>
+                <a:ea typeface="+mn-ea"/>
+                <a:cs typeface="+mn-cs"/>
+                <a:sym typeface="Gill Sans"/>
+              </a:rPr>
+              <a:t>to</a:t>
+            </a:r>
+            <a:r>
+              <a:t> a[n], </a:t>
+            </a:r>
+            <a:r>
+              <a:rPr>
+                <a:latin typeface="+mn-lt"/>
+                <a:ea typeface="+mn-ea"/>
+                <a:cs typeface="+mn-cs"/>
+                <a:sym typeface="Gill Sans"/>
+              </a:rPr>
+              <a:t>and</a:t>
+            </a:r>
+          </a:p>
+          <a:p>
+            <a:pPr lvl="3" marL="0" indent="685800">
               <a:spcBef>
                 <a:spcPts val="600"/>
               </a:spcBef>
               <a:buSzTx/>
               <a:buNone/>
-              <a:defRPr>
+              <a:defRPr i="1">
                 <a:latin typeface="Courier New"/>
                 <a:ea typeface="Courier New"/>
                 <a:cs typeface="Courier New"/>
@@ -4619,17 +4682,26 @@
               </a:defRPr>
             </a:pPr>
             <a:r>
-              <a:t>find the smallest element a[j]</a:t>
-            </a:r>
-          </a:p>
-          <a:p>
-            <a:pPr lvl="2" marL="0" indent="457200">
+              <a:rPr>
+                <a:latin typeface="+mn-lt"/>
+                <a:ea typeface="+mn-ea"/>
+                <a:cs typeface="+mn-cs"/>
+                <a:sym typeface="Gill Sans"/>
+              </a:rPr>
+              <a:t>find the smallest element</a:t>
+            </a:r>
+            <a:r>
+              <a:t> a[j]</a:t>
+            </a:r>
+          </a:p>
+          <a:p>
+            <a:pPr lvl="3" marL="0" indent="685800">
               <a:spcBef>
                 <a:spcPts val="600"/>
               </a:spcBef>
               <a:buSzTx/>
               <a:buNone/>
-              <a:defRPr>
+              <a:defRPr i="1">
                 <a:latin typeface="Courier New"/>
                 <a:ea typeface="Courier New"/>
                 <a:cs typeface="Courier New"/>
@@ -4637,7 +4709,28 @@
               </a:defRPr>
             </a:pPr>
             <a:r>
-              <a:t>Interchange a[i] and a[j]</a:t>
+              <a:rPr>
+                <a:latin typeface="+mn-lt"/>
+                <a:ea typeface="+mn-ea"/>
+                <a:cs typeface="+mn-cs"/>
+                <a:sym typeface="Gill Sans"/>
+              </a:rPr>
+              <a:t>Interchange</a:t>
+            </a:r>
+            <a:r>
+              <a:t> a[i] </a:t>
+            </a:r>
+            <a:r>
+              <a:rPr>
+                <a:latin typeface="+mn-lt"/>
+                <a:ea typeface="+mn-ea"/>
+                <a:cs typeface="+mn-cs"/>
+                <a:sym typeface="Gill Sans"/>
+              </a:rPr>
+              <a:t>and</a:t>
+            </a:r>
+            <a:r>
+              <a:t> a[j]</a:t>
             </a:r>
           </a:p>
           <a:p>
@@ -5466,7 +5559,7 @@
               </a:defRPr>
             </a:pPr>
             <a:r>
-              <a:t>for (int i=0; i&lt;10; i++) {</a:t>
+              <a:t>for (int i=1; i&lt;=n; i++) {</a:t>
             </a:r>
           </a:p>
           <a:p>
@@ -6935,6 +7028,10 @@
           </p:nvPr>
         </p:nvSpPr>
         <p:spPr>
+          <a:xfrm>
+            <a:off x="447385" y="950813"/>
+            <a:ext cx="9265230" cy="5891610"/>
+          </a:xfrm>
           <a:prstGeom prst="rect">
             <a:avLst/>
           </a:prstGeom>
@@ -6957,13 +7054,62 @@
           <a:p>
             <a:pPr lvl="2"/>
             <a:r>
-              <a:t>Factorial: n! = n * (n-1)!</a:t>
+              <a:t>Factorial: </a:t>
+            </a:r>
+            <a:r>
+              <a:rPr>
+                <a:latin typeface="Courier New"/>
+                <a:ea typeface="Courier New"/>
+                <a:cs typeface="Courier New"/>
+                <a:sym typeface="Courier New"/>
+              </a:rPr>
+              <a:t>n! = n * (n-1)!</a:t>
             </a:r>
           </a:p>
           <a:p>
             <a:pPr lvl="2"/>
             <a:r>
               <a:t>Binomial coefficient: </a:t>
+            </a:r>
+          </a:p>
+          <a:p>
+            <a:pPr lvl="3"/>
+            <a:r>
+              <a:t>write </a:t>
+            </a:r>
+            <a:r>
+              <a:rPr baseline="31999">
+                <a:latin typeface="Courier New"/>
+                <a:ea typeface="Courier New"/>
+                <a:cs typeface="Courier New"/>
+                <a:sym typeface="Courier New"/>
+              </a:rPr>
+              <a:t>n</a:t>
+            </a:r>
+            <a:r>
+              <a:rPr>
+                <a:latin typeface="Courier New"/>
+                <a:ea typeface="Courier New"/>
+                <a:cs typeface="Courier New"/>
+                <a:sym typeface="Courier New"/>
+              </a:rPr>
+              <a:t>C</a:t>
+            </a:r>
+            <a:r>
+              <a:rPr baseline="-5999">
+                <a:latin typeface="Courier New"/>
+                <a:ea typeface="Courier New"/>
+                <a:cs typeface="Courier New"/>
+                <a:sym typeface="Courier New"/>
+              </a:rPr>
+              <a:t>k</a:t>
+            </a:r>
+            <a:r>
+              <a:rPr baseline="-5999"/>
+              <a:t> </a:t>
+            </a:r>
+            <a:r>
+              <a:t>recursively (Use pascal triangle)</a:t>
             </a:r>
           </a:p>
           <a:p>
@@ -7007,7 +7153,7 @@
             </a:r>
             <a:r>
               <a:rPr baseline="31999"/>
-              <a:t>n</a:t>
+              <a:t>n-1</a:t>
             </a:r>
             <a:r>
               <a:t>C</a:t>
@@ -7036,9 +7182,11 @@
             </a:r>
           </a:p>
           <a:p>
-            <a:pPr/>
-            <a:r>
-              <a:t>Works well for problem which can be described using recursion</a:t>
+            <a:pPr marL="382587" indent="-342899">
+              <a:defRPr sz="2700"/>
+            </a:pPr>
+            <a:r>
+              <a:t>Works well where problem can be described using recursion</a:t>
             </a:r>
           </a:p>
         </p:txBody>
@@ -7604,6 +7752,54 @@
                                           <p:spTgt spid="133">
                                             <p:txEl>
                                               <p:pRg st="8" end="8"/>
+                                            </p:txEl>
+                                          </p:spTgt>
+                                        </p:tgtEl>
+                                        <p:attrNameLst>
+                                          <p:attrName>style.visibility</p:attrName>
+                                        </p:attrNameLst>
+                                      </p:cBhvr>
+                                      <p:to>
+                                        <p:strVal val="visible"/>
+                                      </p:to>
+                                    </p:set>
+                                  </p:childTnLst>
+                                </p:cTn>
+                              </p:par>
+                            </p:childTnLst>
+                          </p:cTn>
+                        </p:par>
+                      </p:childTnLst>
+                    </p:cTn>
+                  </p:par>
+                  <p:par>
+                    <p:cTn id="41" fill="hold">
+                      <p:stCondLst>
+                        <p:cond delay="indefinite"/>
+                      </p:stCondLst>
+                      <p:childTnLst>
+                        <p:par>
+                          <p:cTn id="42" fill="hold">
+                            <p:stCondLst>
+                              <p:cond delay="0"/>
+                            </p:stCondLst>
+                            <p:childTnLst>
+                              <p:par>
+                                <p:cTn id="43" presetClass="entr" nodeType="clickEffect" presetSubtype="0" presetID="1" grpId="1" fill="hold">
+                                  <p:stCondLst>
+                                    <p:cond delay="0"/>
+                                  </p:stCondLst>
+                                  <p:iterate type="el" backwards="0">
+                                    <p:tmAbs val="0"/>
+                                  </p:iterate>
+                                  <p:childTnLst>
+                                    <p:set>
+                                      <p:cBhvr>
+                                        <p:cTn id="44" fill="hold"/>
+                                        <p:tgtEl>
+                                          <p:spTgt spid="133">
+                                            <p:txEl>
+                                              <p:pRg st="9" end="9"/>
                                             </p:txEl>
                                           </p:spTgt>
                                         </p:tgtEl>
@@ -8773,7 +8969,7 @@
         <p:spPr>
           <a:xfrm>
             <a:off x="447385" y="864195"/>
-            <a:ext cx="9265230" cy="2682339"/>
+            <a:ext cx="9265230" cy="2882809"/>
           </a:xfrm>
           <a:prstGeom prst="rect">
             <a:avLst/>
@@ -8801,7 +8997,7 @@
               <a:defRPr sz="3000"/>
             </a:pPr>
             <a:r>
-              <a:t>I/p: N disks on Tower A, o/p:: N discs on Tower B</a:t>
+              <a:t>Input: N disks on Tower A, o/p:: N discs on Tower B</a:t>
             </a:r>
           </a:p>
           <a:p>
@@ -8822,7 +9018,28 @@
               </a:spcBef>
             </a:pPr>
             <a:r>
-              <a:t>S1: Move top N-1 discs from A to C using B</a:t>
+              <a:rPr>
+                <a:latin typeface="Courier New"/>
+                <a:ea typeface="Courier New"/>
+                <a:cs typeface="Courier New"/>
+                <a:sym typeface="Courier New"/>
+              </a:rPr>
+              <a:t>S1</a:t>
+            </a:r>
+            <a:r>
+              <a:t>: Move top </a:t>
+            </a:r>
+            <a:r>
+              <a:rPr>
+                <a:latin typeface="Courier New"/>
+                <a:ea typeface="Courier New"/>
+                <a:cs typeface="Courier New"/>
+                <a:sym typeface="Courier New"/>
+              </a:rPr>
+              <a:t>N-1</a:t>
+            </a:r>
+            <a:r>
+              <a:t> discs from A to C using B</a:t>
             </a:r>
           </a:p>
           <a:p>
@@ -8832,7 +9049,28 @@
               </a:spcBef>
             </a:pPr>
             <a:r>
-              <a:t>S2: Move largest disc to tower B</a:t>
+              <a:rPr>
+                <a:latin typeface="Courier New"/>
+                <a:ea typeface="Courier New"/>
+                <a:cs typeface="Courier New"/>
+                <a:sym typeface="Courier New"/>
+              </a:rPr>
+              <a:t>S2</a:t>
+            </a:r>
+            <a:r>
+              <a:t>: Move largest disc </a:t>
+            </a:r>
+            <a:r>
+              <a:rPr>
+                <a:latin typeface="Courier New"/>
+                <a:ea typeface="Courier New"/>
+                <a:cs typeface="Courier New"/>
+                <a:sym typeface="Courier New"/>
+              </a:rPr>
+              <a:t>N</a:t>
+            </a:r>
+            <a:r>
+              <a:t> to tower B</a:t>
             </a:r>
           </a:p>
           <a:p>
@@ -8842,7 +9080,28 @@
               </a:spcBef>
             </a:pPr>
             <a:r>
-              <a:t>S3: Move top N-1 discs from C to B using A</a:t>
+              <a:rPr>
+                <a:latin typeface="Courier New"/>
+                <a:ea typeface="Courier New"/>
+                <a:cs typeface="Courier New"/>
+                <a:sym typeface="Courier New"/>
+              </a:rPr>
+              <a:t>S3</a:t>
+            </a:r>
+            <a:r>
+              <a:t>: Move top </a:t>
+            </a:r>
+            <a:r>
+              <a:rPr>
+                <a:latin typeface="Courier New"/>
+                <a:ea typeface="Courier New"/>
+                <a:cs typeface="Courier New"/>
+                <a:sym typeface="Courier New"/>
+              </a:rPr>
+              <a:t>N-1</a:t>
+            </a:r>
+            <a:r>
+              <a:t> discs from C to B using A</a:t>
             </a:r>
           </a:p>
         </p:txBody>
@@ -8954,38 +9213,67 @@
           </a:p>
         </p:txBody>
       </p:sp>
+      <p:sp>
+        <p:nvSpPr>
+          <p:cNvPr id="166" name="Rectangle"/>
+          <p:cNvSpPr/>
+          <p:nvPr/>
+        </p:nvSpPr>
+        <p:spPr>
+          <a:xfrm>
+            <a:off x="1094085" y="6085004"/>
+            <a:ext cx="1740364" cy="373386"/>
+          </a:xfrm>
+          <a:prstGeom prst="rect">
+            <a:avLst/>
+          </a:prstGeom>
+          <a:solidFill>
+            <a:srgbClr val="00D2A9"/>
+          </a:solidFill>
+          <a:ln>
+            <a:solidFill>
+              <a:srgbClr val="000000"/>
+            </a:solidFill>
+          </a:ln>
+        </p:spPr>
+        <p:txBody>
+          <a:bodyPr lIns="50800" tIns="50800" rIns="50800" bIns="50800" anchor="ctr"/>
+          <a:lstStyle/>
+          <a:p>
+            <a:pPr/>
+          </a:p>
+        </p:txBody>
+      </p:sp>
       <p:grpSp>
         <p:nvGrpSpPr>
-          <p:cNvPr id="182" name="Group"/>
+          <p:cNvPr id="169" name="Group"/>
           <p:cNvGrpSpPr/>
           <p:nvPr/>
         </p:nvGrpSpPr>
         <p:grpSpPr>
           <a:xfrm>
             <a:off x="823700" y="4497075"/>
-            <a:ext cx="8512600" cy="2498509"/>
+            <a:ext cx="2281134" cy="1979925"/>
             <a:chOff x="0" y="0"/>
-            <a:chExt cx="8512599" cy="2498507"/>
+            <a:chExt cx="2281132" cy="1979924"/>
           </a:xfrm>
         </p:grpSpPr>
         <p:sp>
           <p:nvSpPr>
-            <p:cNvPr id="166" name="Rectangle"/>
+            <p:cNvPr id="167" name="Line"/>
             <p:cNvSpPr/>
             <p:nvPr/>
           </p:nvSpPr>
           <p:spPr>
             <a:xfrm>
-              <a:off x="270384" y="1587928"/>
-              <a:ext cx="1740364" cy="373386"/>
+              <a:off x="0" y="1979924"/>
+              <a:ext cx="2281133" cy="1"/>
             </a:xfrm>
-            <a:prstGeom prst="rect">
+            <a:prstGeom prst="line">
               <a:avLst/>
             </a:prstGeom>
-            <a:solidFill>
-              <a:srgbClr val="00D2A9"/>
-            </a:solidFill>
-            <a:ln w="9525" cap="flat">
+            <a:noFill/>
+            <a:ln w="25400" cap="flat">
               <a:solidFill>
                 <a:srgbClr val="000000"/>
               </a:solidFill>
@@ -8995,7 +9283,7 @@
             <a:effectLst/>
           </p:spPr>
           <p:txBody>
-            <a:bodyPr wrap="square" lIns="50800" tIns="50800" rIns="50800" bIns="50800" numCol="1" anchor="ctr">
+            <a:bodyPr wrap="square" lIns="0" tIns="0" rIns="0" bIns="0" numCol="1" anchor="t">
               <a:noAutofit/>
             </a:bodyPr>
             <a:lstStyle/>
@@ -9004,399 +9292,356 @@
             </a:p>
           </p:txBody>
         </p:sp>
-        <p:grpSp>
-          <p:nvGrpSpPr>
-            <p:cNvPr id="169" name="Group"/>
-            <p:cNvGrpSpPr/>
-            <p:nvPr/>
-          </p:nvGrpSpPr>
-          <p:grpSpPr>
-            <a:xfrm>
-              <a:off x="0" y="-1"/>
-              <a:ext cx="2281133" cy="1979926"/>
-              <a:chOff x="0" y="0"/>
-              <a:chExt cx="2281132" cy="1979924"/>
-            </a:xfrm>
-          </p:grpSpPr>
-          <p:sp>
-            <p:nvSpPr>
-              <p:cNvPr id="167" name="Line"/>
-              <p:cNvSpPr/>
-              <p:nvPr/>
-            </p:nvSpPr>
-            <p:spPr>
-              <a:xfrm>
-                <a:off x="0" y="1979924"/>
-                <a:ext cx="2281133" cy="1"/>
-              </a:xfrm>
-              <a:prstGeom prst="line">
-                <a:avLst/>
-              </a:prstGeom>
-              <a:noFill/>
-              <a:ln w="25400" cap="flat">
-                <a:solidFill>
-                  <a:srgbClr val="000000"/>
-                </a:solidFill>
-                <a:prstDash val="solid"/>
-                <a:round/>
-              </a:ln>
-              <a:effectLst/>
-            </p:spPr>
-            <p:txBody>
-              <a:bodyPr wrap="square" lIns="0" tIns="0" rIns="0" bIns="0" numCol="1" anchor="t">
-                <a:noAutofit/>
-              </a:bodyPr>
-              <a:lstStyle/>
-              <a:p>
-                <a:pPr/>
-              </a:p>
-            </p:txBody>
-          </p:sp>
-          <p:sp>
-            <p:nvSpPr>
-              <p:cNvPr id="168" name="Line"/>
-              <p:cNvSpPr/>
-              <p:nvPr/>
-            </p:nvSpPr>
-            <p:spPr>
-              <a:xfrm flipV="1">
-                <a:off x="1140566" y="-1"/>
-                <a:ext cx="1" cy="1971459"/>
-              </a:xfrm>
-              <a:prstGeom prst="line">
-                <a:avLst/>
-              </a:prstGeom>
-              <a:noFill/>
-              <a:ln w="25400" cap="flat">
-                <a:solidFill>
-                  <a:srgbClr val="000000"/>
-                </a:solidFill>
-                <a:prstDash val="solid"/>
-                <a:round/>
-              </a:ln>
-              <a:effectLst/>
-            </p:spPr>
-            <p:txBody>
-              <a:bodyPr wrap="square" lIns="0" tIns="0" rIns="0" bIns="0" numCol="1" anchor="t">
-                <a:noAutofit/>
-              </a:bodyPr>
-              <a:lstStyle/>
-              <a:p>
-                <a:pPr/>
-              </a:p>
-            </p:txBody>
-          </p:sp>
-        </p:grpSp>
-        <p:grpSp>
-          <p:nvGrpSpPr>
-            <p:cNvPr id="172" name="Group"/>
-            <p:cNvGrpSpPr/>
-            <p:nvPr/>
-          </p:nvGrpSpPr>
-          <p:grpSpPr>
-            <a:xfrm>
-              <a:off x="3115733" y="-1"/>
-              <a:ext cx="2281134" cy="1979926"/>
-              <a:chOff x="0" y="0"/>
-              <a:chExt cx="2281132" cy="1979924"/>
-            </a:xfrm>
-          </p:grpSpPr>
-          <p:sp>
-            <p:nvSpPr>
-              <p:cNvPr id="170" name="Line"/>
-              <p:cNvSpPr/>
-              <p:nvPr/>
-            </p:nvSpPr>
-            <p:spPr>
-              <a:xfrm>
-                <a:off x="0" y="1979924"/>
-                <a:ext cx="2281133" cy="1"/>
-              </a:xfrm>
-              <a:prstGeom prst="line">
-                <a:avLst/>
-              </a:prstGeom>
-              <a:noFill/>
-              <a:ln w="25400" cap="flat">
-                <a:solidFill>
-                  <a:srgbClr val="000000"/>
-                </a:solidFill>
-                <a:prstDash val="solid"/>
-                <a:round/>
-              </a:ln>
-              <a:effectLst/>
-            </p:spPr>
-            <p:txBody>
-              <a:bodyPr wrap="square" lIns="0" tIns="0" rIns="0" bIns="0" numCol="1" anchor="t">
-                <a:noAutofit/>
-              </a:bodyPr>
-              <a:lstStyle/>
-              <a:p>
-                <a:pPr/>
-              </a:p>
-            </p:txBody>
-          </p:sp>
-          <p:sp>
-            <p:nvSpPr>
-              <p:cNvPr id="171" name="Line"/>
-              <p:cNvSpPr/>
-              <p:nvPr/>
-            </p:nvSpPr>
-            <p:spPr>
-              <a:xfrm flipV="1">
-                <a:off x="1140566" y="-1"/>
-                <a:ext cx="1" cy="1971459"/>
-              </a:xfrm>
-              <a:prstGeom prst="line">
-                <a:avLst/>
-              </a:prstGeom>
-              <a:noFill/>
-              <a:ln w="25400" cap="flat">
-                <a:solidFill>
-                  <a:srgbClr val="000000"/>
-                </a:solidFill>
-                <a:prstDash val="solid"/>
-                <a:round/>
-              </a:ln>
-              <a:effectLst/>
-            </p:spPr>
-            <p:txBody>
-              <a:bodyPr wrap="square" lIns="0" tIns="0" rIns="0" bIns="0" numCol="1" anchor="t">
-                <a:noAutofit/>
-              </a:bodyPr>
-              <a:lstStyle/>
-              <a:p>
-                <a:pPr/>
-              </a:p>
-            </p:txBody>
-          </p:sp>
-        </p:grpSp>
-        <p:grpSp>
-          <p:nvGrpSpPr>
-            <p:cNvPr id="175" name="Group"/>
-            <p:cNvGrpSpPr/>
-            <p:nvPr/>
-          </p:nvGrpSpPr>
-          <p:grpSpPr>
-            <a:xfrm>
-              <a:off x="6231466" y="-1"/>
-              <a:ext cx="2281134" cy="1979926"/>
-              <a:chOff x="0" y="0"/>
-              <a:chExt cx="2281132" cy="1979924"/>
-            </a:xfrm>
-          </p:grpSpPr>
-          <p:sp>
-            <p:nvSpPr>
-              <p:cNvPr id="173" name="Line"/>
-              <p:cNvSpPr/>
-              <p:nvPr/>
-            </p:nvSpPr>
-            <p:spPr>
-              <a:xfrm>
-                <a:off x="0" y="1979924"/>
-                <a:ext cx="2281133" cy="1"/>
-              </a:xfrm>
-              <a:prstGeom prst="line">
-                <a:avLst/>
-              </a:prstGeom>
-              <a:noFill/>
-              <a:ln w="25400" cap="flat">
-                <a:solidFill>
-                  <a:srgbClr val="000000"/>
-                </a:solidFill>
-                <a:prstDash val="solid"/>
-                <a:round/>
-              </a:ln>
-              <a:effectLst/>
-            </p:spPr>
-            <p:txBody>
-              <a:bodyPr wrap="square" lIns="0" tIns="0" rIns="0" bIns="0" numCol="1" anchor="t">
-                <a:noAutofit/>
-              </a:bodyPr>
-              <a:lstStyle/>
-              <a:p>
-                <a:pPr/>
-              </a:p>
-            </p:txBody>
-          </p:sp>
-          <p:sp>
-            <p:nvSpPr>
-              <p:cNvPr id="174" name="Line"/>
-              <p:cNvSpPr/>
-              <p:nvPr/>
-            </p:nvSpPr>
-            <p:spPr>
-              <a:xfrm flipV="1">
-                <a:off x="1140566" y="-1"/>
-                <a:ext cx="1" cy="1971459"/>
-              </a:xfrm>
-              <a:prstGeom prst="line">
-                <a:avLst/>
-              </a:prstGeom>
-              <a:noFill/>
-              <a:ln w="25400" cap="flat">
-                <a:solidFill>
-                  <a:srgbClr val="000000"/>
-                </a:solidFill>
-                <a:prstDash val="solid"/>
-                <a:round/>
-              </a:ln>
-              <a:effectLst/>
-            </p:spPr>
-            <p:txBody>
-              <a:bodyPr wrap="square" lIns="0" tIns="0" rIns="0" bIns="0" numCol="1" anchor="t">
-                <a:noAutofit/>
-              </a:bodyPr>
-              <a:lstStyle/>
-              <a:p>
-                <a:pPr/>
-              </a:p>
-            </p:txBody>
-          </p:sp>
-        </p:grpSp>
         <p:sp>
           <p:nvSpPr>
-            <p:cNvPr id="176" name="Tower A"/>
-            <p:cNvSpPr txBox="1"/>
+            <p:cNvPr id="168" name="Line"/>
+            <p:cNvSpPr/>
+            <p:nvPr/>
+          </p:nvSpPr>
+          <p:spPr>
+            <a:xfrm flipV="1">
+              <a:off x="1140566" y="-1"/>
+              <a:ext cx="1" cy="1971459"/>
+            </a:xfrm>
+            <a:prstGeom prst="line">
+              <a:avLst/>
+            </a:prstGeom>
+            <a:noFill/>
+            <a:ln w="25400" cap="flat">
+              <a:solidFill>
+                <a:srgbClr val="000000"/>
+              </a:solidFill>
+              <a:prstDash val="solid"/>
+              <a:round/>
+            </a:ln>
+            <a:effectLst/>
+          </p:spPr>
+          <p:txBody>
+            <a:bodyPr wrap="square" lIns="0" tIns="0" rIns="0" bIns="0" numCol="1" anchor="t">
+              <a:noAutofit/>
+            </a:bodyPr>
+            <a:lstStyle/>
+            <a:p>
+              <a:pPr/>
+            </a:p>
+          </p:txBody>
+        </p:sp>
+      </p:grpSp>
+      <p:grpSp>
+        <p:nvGrpSpPr>
+          <p:cNvPr id="172" name="Group"/>
+          <p:cNvGrpSpPr/>
+          <p:nvPr/>
+        </p:nvGrpSpPr>
+        <p:grpSpPr>
+          <a:xfrm>
+            <a:off x="3939434" y="4497075"/>
+            <a:ext cx="2281133" cy="1979925"/>
+            <a:chOff x="0" y="0"/>
+            <a:chExt cx="2281132" cy="1979924"/>
+          </a:xfrm>
+        </p:grpSpPr>
+        <p:sp>
+          <p:nvSpPr>
+            <p:cNvPr id="170" name="Line"/>
+            <p:cNvSpPr/>
             <p:nvPr/>
           </p:nvSpPr>
           <p:spPr>
             <a:xfrm>
-              <a:off x="412531" y="1952407"/>
-              <a:ext cx="1456071" cy="546101"/>
+              <a:off x="0" y="1979924"/>
+              <a:ext cx="2281133" cy="1"/>
             </a:xfrm>
-            <a:prstGeom prst="rect">
+            <a:prstGeom prst="line">
               <a:avLst/>
             </a:prstGeom>
             <a:noFill/>
-            <a:ln w="12700" cap="flat">
-              <a:noFill/>
-              <a:miter lim="400000"/>
+            <a:ln w="25400" cap="flat">
+              <a:solidFill>
+                <a:srgbClr val="000000"/>
+              </a:solidFill>
+              <a:prstDash val="solid"/>
+              <a:round/>
             </a:ln>
             <a:effectLst/>
-            <a:extLst>
-              <a:ext uri="{C572A759-6A51-4108-AA02-DFA0A04FC94B}">
-                <ma14:wrappingTextBoxFlag xmlns:ma14="http://schemas.microsoft.com/office/mac/drawingml/2011/main" val="1"/>
-              </a:ext>
-            </a:extLst>
           </p:spPr>
           <p:txBody>
-            <a:bodyPr wrap="none" lIns="50800" tIns="50800" rIns="50800" bIns="50800" numCol="1" anchor="ctr">
-              <a:spAutoFit/>
+            <a:bodyPr wrap="square" lIns="0" tIns="0" rIns="0" bIns="0" numCol="1" anchor="t">
+              <a:noAutofit/>
             </a:bodyPr>
-            <a:lstStyle>
-              <a:lvl1pPr>
-                <a:defRPr sz="3000">
-                  <a:latin typeface="Gill Sans MT"/>
-                  <a:ea typeface="Gill Sans MT"/>
-                  <a:cs typeface="Gill Sans MT"/>
-                  <a:sym typeface="Gill Sans MT"/>
-                </a:defRPr>
-              </a:lvl1pPr>
-            </a:lstStyle>
+            <a:lstStyle/>
             <a:p>
               <a:pPr/>
-              <a:r>
-                <a:t>Tower A</a:t>
-              </a:r>
             </a:p>
           </p:txBody>
         </p:sp>
         <p:sp>
           <p:nvSpPr>
-            <p:cNvPr id="177" name="Tower B"/>
-            <p:cNvSpPr txBox="1"/>
+            <p:cNvPr id="171" name="Line"/>
+            <p:cNvSpPr/>
+            <p:nvPr/>
+          </p:nvSpPr>
+          <p:spPr>
+            <a:xfrm flipV="1">
+              <a:off x="1140566" y="-1"/>
+              <a:ext cx="1" cy="1971459"/>
+            </a:xfrm>
+            <a:prstGeom prst="line">
+              <a:avLst/>
+            </a:prstGeom>
+            <a:noFill/>
+            <a:ln w="25400" cap="flat">
+              <a:solidFill>
+                <a:srgbClr val="000000"/>
+              </a:solidFill>
+              <a:prstDash val="solid"/>
+              <a:round/>
+            </a:ln>
+            <a:effectLst/>
+          </p:spPr>
+          <p:txBody>
+            <a:bodyPr wrap="square" lIns="0" tIns="0" rIns="0" bIns="0" numCol="1" anchor="t">
+              <a:noAutofit/>
+            </a:bodyPr>
+            <a:lstStyle/>
+            <a:p>
+              <a:pPr/>
+            </a:p>
+          </p:txBody>
+        </p:sp>
+      </p:grpSp>
+      <p:grpSp>
+        <p:nvGrpSpPr>
+          <p:cNvPr id="175" name="Group"/>
+          <p:cNvGrpSpPr/>
+          <p:nvPr/>
+        </p:nvGrpSpPr>
+        <p:grpSpPr>
+          <a:xfrm>
+            <a:off x="7055167" y="4497075"/>
+            <a:ext cx="2281133" cy="1979925"/>
+            <a:chOff x="0" y="0"/>
+            <a:chExt cx="2281132" cy="1979924"/>
+          </a:xfrm>
+        </p:grpSpPr>
+        <p:sp>
+          <p:nvSpPr>
+            <p:cNvPr id="173" name="Line"/>
+            <p:cNvSpPr/>
             <p:nvPr/>
           </p:nvSpPr>
           <p:spPr>
             <a:xfrm>
-              <a:off x="3528264" y="1952407"/>
-              <a:ext cx="1454583" cy="546101"/>
+              <a:off x="0" y="1979924"/>
+              <a:ext cx="2281133" cy="1"/>
             </a:xfrm>
-            <a:prstGeom prst="rect">
+            <a:prstGeom prst="line">
               <a:avLst/>
             </a:prstGeom>
             <a:noFill/>
-            <a:ln w="12700" cap="flat">
-              <a:noFill/>
-              <a:miter lim="400000"/>
+            <a:ln w="25400" cap="flat">
+              <a:solidFill>
+                <a:srgbClr val="000000"/>
+              </a:solidFill>
+              <a:prstDash val="solid"/>
+              <a:round/>
             </a:ln>
             <a:effectLst/>
-            <a:extLst>
-              <a:ext uri="{C572A759-6A51-4108-AA02-DFA0A04FC94B}">
-                <ma14:wrappingTextBoxFlag xmlns:ma14="http://schemas.microsoft.com/office/mac/drawingml/2011/main" val="1"/>
-              </a:ext>
-            </a:extLst>
           </p:spPr>
           <p:txBody>
-            <a:bodyPr wrap="none" lIns="50800" tIns="50800" rIns="50800" bIns="50800" numCol="1" anchor="ctr">
-              <a:spAutoFit/>
+            <a:bodyPr wrap="square" lIns="0" tIns="0" rIns="0" bIns="0" numCol="1" anchor="t">
+              <a:noAutofit/>
             </a:bodyPr>
-            <a:lstStyle>
-              <a:lvl1pPr>
-                <a:defRPr sz="3000">
-                  <a:latin typeface="Gill Sans MT"/>
-                  <a:ea typeface="Gill Sans MT"/>
-                  <a:cs typeface="Gill Sans MT"/>
-                  <a:sym typeface="Gill Sans MT"/>
-                </a:defRPr>
-              </a:lvl1pPr>
-            </a:lstStyle>
+            <a:lstStyle/>
             <a:p>
               <a:pPr/>
-              <a:r>
-                <a:t>Tower B</a:t>
-              </a:r>
             </a:p>
           </p:txBody>
         </p:sp>
         <p:sp>
           <p:nvSpPr>
-            <p:cNvPr id="178" name="Tower C"/>
-            <p:cNvSpPr txBox="1"/>
+            <p:cNvPr id="174" name="Line"/>
+            <p:cNvSpPr/>
             <p:nvPr/>
           </p:nvSpPr>
           <p:spPr>
-            <a:xfrm>
-              <a:off x="6639765" y="1901607"/>
-              <a:ext cx="1509835" cy="546101"/>
+            <a:xfrm flipV="1">
+              <a:off x="1140566" y="-1"/>
+              <a:ext cx="1" cy="1971459"/>
             </a:xfrm>
-            <a:prstGeom prst="rect">
+            <a:prstGeom prst="line">
               <a:avLst/>
             </a:prstGeom>
             <a:noFill/>
-            <a:ln w="12700" cap="flat">
-              <a:noFill/>
-              <a:miter lim="400000"/>
+            <a:ln w="25400" cap="flat">
+              <a:solidFill>
+                <a:srgbClr val="000000"/>
+              </a:solidFill>
+              <a:prstDash val="solid"/>
+              <a:round/>
             </a:ln>
             <a:effectLst/>
-            <a:extLst>
-              <a:ext uri="{C572A759-6A51-4108-AA02-DFA0A04FC94B}">
-                <ma14:wrappingTextBoxFlag xmlns:ma14="http://schemas.microsoft.com/office/mac/drawingml/2011/main" val="1"/>
-              </a:ext>
-            </a:extLst>
           </p:spPr>
           <p:txBody>
-            <a:bodyPr wrap="none" lIns="50800" tIns="50800" rIns="50800" bIns="50800" numCol="1" anchor="ctr">
-              <a:spAutoFit/>
+            <a:bodyPr wrap="square" lIns="0" tIns="0" rIns="0" bIns="0" numCol="1" anchor="t">
+              <a:noAutofit/>
             </a:bodyPr>
-            <a:lstStyle>
-              <a:lvl1pPr>
-                <a:defRPr sz="3000">
-                  <a:latin typeface="Gill Sans MT"/>
-                  <a:ea typeface="Gill Sans MT"/>
-                  <a:cs typeface="Gill Sans MT"/>
-                  <a:sym typeface="Gill Sans MT"/>
-                </a:defRPr>
-              </a:lvl1pPr>
-            </a:lstStyle>
+            <a:lstStyle/>
             <a:p>
               <a:pPr/>
-              <a:r>
-                <a:t>Tower C</a:t>
-              </a:r>
             </a:p>
           </p:txBody>
         </p:sp>
+      </p:grpSp>
+      <p:sp>
+        <p:nvSpPr>
+          <p:cNvPr id="176" name="Tower A"/>
+          <p:cNvSpPr txBox="1"/>
+          <p:nvPr/>
+        </p:nvSpPr>
+        <p:spPr>
+          <a:xfrm>
+            <a:off x="1236231" y="6449483"/>
+            <a:ext cx="1456071" cy="546101"/>
+          </a:xfrm>
+          <a:prstGeom prst="rect">
+            <a:avLst/>
+          </a:prstGeom>
+          <a:ln w="12700">
+            <a:miter lim="400000"/>
+          </a:ln>
+          <a:extLst>
+            <a:ext uri="{C572A759-6A51-4108-AA02-DFA0A04FC94B}">
+              <ma14:wrappingTextBoxFlag xmlns:ma14="http://schemas.microsoft.com/office/mac/drawingml/2011/main" val="1"/>
+            </a:ext>
+          </a:extLst>
+        </p:spPr>
+        <p:txBody>
+          <a:bodyPr wrap="none" lIns="50800" tIns="50800" rIns="50800" bIns="50800" anchor="ctr">
+            <a:spAutoFit/>
+          </a:bodyPr>
+          <a:lstStyle>
+            <a:lvl1pPr>
+              <a:defRPr sz="3000">
+                <a:latin typeface="Gill Sans MT"/>
+                <a:ea typeface="Gill Sans MT"/>
+                <a:cs typeface="Gill Sans MT"/>
+                <a:sym typeface="Gill Sans MT"/>
+              </a:defRPr>
+            </a:lvl1pPr>
+          </a:lstStyle>
+          <a:p>
+            <a:pPr/>
+            <a:r>
+              <a:t>Tower A</a:t>
+            </a:r>
+          </a:p>
+        </p:txBody>
+      </p:sp>
+      <p:sp>
+        <p:nvSpPr>
+          <p:cNvPr id="177" name="Tower B"/>
+          <p:cNvSpPr txBox="1"/>
+          <p:nvPr/>
+        </p:nvSpPr>
+        <p:spPr>
+          <a:xfrm>
+            <a:off x="4351965" y="6449483"/>
+            <a:ext cx="1454582" cy="546101"/>
+          </a:xfrm>
+          <a:prstGeom prst="rect">
+            <a:avLst/>
+          </a:prstGeom>
+          <a:ln w="12700">
+            <a:miter lim="400000"/>
+          </a:ln>
+          <a:extLst>
+            <a:ext uri="{C572A759-6A51-4108-AA02-DFA0A04FC94B}">
+              <ma14:wrappingTextBoxFlag xmlns:ma14="http://schemas.microsoft.com/office/mac/drawingml/2011/main" val="1"/>
+            </a:ext>
+          </a:extLst>
+        </p:spPr>
+        <p:txBody>
+          <a:bodyPr wrap="none" lIns="50800" tIns="50800" rIns="50800" bIns="50800" anchor="ctr">
+            <a:spAutoFit/>
+          </a:bodyPr>
+          <a:lstStyle>
+            <a:lvl1pPr>
+              <a:defRPr sz="3000">
+                <a:latin typeface="Gill Sans MT"/>
+                <a:ea typeface="Gill Sans MT"/>
+                <a:cs typeface="Gill Sans MT"/>
+                <a:sym typeface="Gill Sans MT"/>
+              </a:defRPr>
+            </a:lvl1pPr>
+          </a:lstStyle>
+          <a:p>
+            <a:pPr/>
+            <a:r>
+              <a:t>Tower B</a:t>
+            </a:r>
+          </a:p>
+        </p:txBody>
+      </p:sp>
+      <p:sp>
+        <p:nvSpPr>
+          <p:cNvPr id="178" name="Tower C"/>
+          <p:cNvSpPr txBox="1"/>
+          <p:nvPr/>
+        </p:nvSpPr>
+        <p:spPr>
+          <a:xfrm>
+            <a:off x="7463465" y="6398683"/>
+            <a:ext cx="1509835" cy="546101"/>
+          </a:xfrm>
+          <a:prstGeom prst="rect">
+            <a:avLst/>
+          </a:prstGeom>
+          <a:ln w="12700">
+            <a:miter lim="400000"/>
+          </a:ln>
+          <a:extLst>
+            <a:ext uri="{C572A759-6A51-4108-AA02-DFA0A04FC94B}">
+              <ma14:wrappingTextBoxFlag xmlns:ma14="http://schemas.microsoft.com/office/mac/drawingml/2011/main" val="1"/>
+            </a:ext>
+          </a:extLst>
+        </p:spPr>
+        <p:txBody>
+          <a:bodyPr wrap="none" lIns="50800" tIns="50800" rIns="50800" bIns="50800" anchor="ctr">
+            <a:spAutoFit/>
+          </a:bodyPr>
+          <a:lstStyle>
+            <a:lvl1pPr>
+              <a:defRPr sz="3000">
+                <a:latin typeface="Gill Sans MT"/>
+                <a:ea typeface="Gill Sans MT"/>
+                <a:cs typeface="Gill Sans MT"/>
+                <a:sym typeface="Gill Sans MT"/>
+              </a:defRPr>
+            </a:lvl1pPr>
+          </a:lstStyle>
+          <a:p>
+            <a:pPr/>
+            <a:r>
+              <a:t>Tower C</a:t>
+            </a:r>
+          </a:p>
+        </p:txBody>
+      </p:sp>
+      <p:grpSp>
+        <p:nvGrpSpPr>
+          <p:cNvPr id="182" name="Group"/>
+          <p:cNvGrpSpPr/>
+          <p:nvPr/>
+        </p:nvGrpSpPr>
+        <p:grpSpPr>
+          <a:xfrm>
+            <a:off x="1387903" y="4648051"/>
+            <a:ext cx="1152728" cy="1414786"/>
+            <a:chOff x="0" y="0"/>
+            <a:chExt cx="1152726" cy="1414784"/>
+          </a:xfrm>
+        </p:grpSpPr>
         <p:sp>
           <p:nvSpPr>
             <p:cNvPr id="179" name="Rectangle"/>
@@ -9405,8 +9650,8 @@
           </p:nvSpPr>
           <p:spPr>
             <a:xfrm>
-              <a:off x="6795670" y="1622892"/>
-              <a:ext cx="1152728" cy="373385"/>
+              <a:off x="0" y="1041400"/>
+              <a:ext cx="1152727" cy="373385"/>
             </a:xfrm>
             <a:prstGeom prst="rect">
               <a:avLst/>
@@ -9445,7 +9690,7 @@
           </p:nvSpPr>
           <p:spPr>
             <a:xfrm>
-              <a:off x="7177065" y="581492"/>
+              <a:off x="381395" y="0"/>
               <a:ext cx="391191" cy="373385"/>
             </a:xfrm>
             <a:prstGeom prst="rect">
@@ -9484,7 +9729,7 @@
           </p:nvSpPr>
           <p:spPr>
             <a:xfrm flipV="1">
-              <a:off x="7568651" y="1056537"/>
+              <a:off x="772980" y="475045"/>
               <a:ext cx="1" cy="431552"/>
             </a:xfrm>
             <a:prstGeom prst="line">
@@ -9977,28 +10222,23 @@
                             </p:stCondLst>
                             <p:childTnLst>
                               <p:par>
-                                <p:cTn id="37" presetClass="entr" nodeType="clickEffect" presetSubtype="0" presetID="1" grpId="3" fill="hold">
+                                <p:cTn id="37" presetClass="path" nodeType="clickEffect" presetSubtype="0" presetID="-1" grpId="3" accel="50000" decel="50000" fill="hold">
                                   <p:stCondLst>
                                     <p:cond delay="0"/>
                                   </p:stCondLst>
-                                  <p:iterate type="el" backwards="0">
-                                    <p:tmAbs val="0"/>
-                                  </p:iterate>
                                   <p:childTnLst>
-                                    <p:set>
+                                    <p:animMotion path="M 0.000000 0.000000 L 0.613333 0.053333" origin="layout" pathEditMode="relative">
                                       <p:cBhvr>
-                                        <p:cTn id="38" fill="hold"/>
+                                        <p:cTn id="38" dur="1000" fill="hold"/>
                                         <p:tgtEl>
                                           <p:spTgt spid="182"/>
                                         </p:tgtEl>
                                         <p:attrNameLst>
-                                          <p:attrName>style.visibility</p:attrName>
+                                          <p:attrName>ppt_x</p:attrName>
+                                          <p:attrName>ppt_y</p:attrName>
                                         </p:attrNameLst>
                                       </p:cBhvr>
-                                      <p:to>
-                                        <p:strVal val="visible"/>
-                                      </p:to>
-                                    </p:set>
+                                    </p:animMotion>
                                   </p:childTnLst>
                                 </p:cTn>
                               </p:par>
@@ -10031,7 +10271,6 @@
     </p:tnLst>
     <p:bldLst>
       <p:bldP build="p" bldLvl="5" animBg="1" rev="0" advAuto="0" spid="162" grpId="1"/>
-      <p:bldP build="whole" bldLvl="1" animBg="1" rev="0" advAuto="0" spid="182" grpId="3"/>
       <p:bldP build="p" bldLvl="5" animBg="1" rev="0" advAuto="0" spid="183" grpId="2"/>
     </p:bldLst>
   </p:timing>
@@ -10214,38 +10453,67 @@
           </a:p>
         </p:txBody>
       </p:sp>
+      <p:sp>
+        <p:nvSpPr>
+          <p:cNvPr id="190" name="Rectangle"/>
+          <p:cNvSpPr/>
+          <p:nvPr/>
+        </p:nvSpPr>
+        <p:spPr>
+          <a:xfrm>
+            <a:off x="1094085" y="2966789"/>
+            <a:ext cx="1740364" cy="373386"/>
+          </a:xfrm>
+          <a:prstGeom prst="rect">
+            <a:avLst/>
+          </a:prstGeom>
+          <a:solidFill>
+            <a:srgbClr val="00D2A9"/>
+          </a:solidFill>
+          <a:ln>
+            <a:solidFill>
+              <a:srgbClr val="000000"/>
+            </a:solidFill>
+          </a:ln>
+        </p:spPr>
+        <p:txBody>
+          <a:bodyPr lIns="50800" tIns="50800" rIns="50800" bIns="50800" anchor="ctr"/>
+          <a:lstStyle/>
+          <a:p>
+            <a:pPr/>
+          </a:p>
+        </p:txBody>
+      </p:sp>
       <p:grpSp>
         <p:nvGrpSpPr>
-          <p:cNvPr id="206" name="Group"/>
+          <p:cNvPr id="193" name="Group"/>
           <p:cNvGrpSpPr/>
           <p:nvPr/>
         </p:nvGrpSpPr>
         <p:grpSpPr>
           <a:xfrm>
             <a:off x="823700" y="1364408"/>
-            <a:ext cx="8512600" cy="2498509"/>
+            <a:ext cx="2281134" cy="1979926"/>
             <a:chOff x="0" y="0"/>
-            <a:chExt cx="8512599" cy="2498507"/>
+            <a:chExt cx="2281132" cy="1979924"/>
           </a:xfrm>
         </p:grpSpPr>
         <p:sp>
           <p:nvSpPr>
-            <p:cNvPr id="190" name="Rectangle"/>
+            <p:cNvPr id="191" name="Line"/>
             <p:cNvSpPr/>
             <p:nvPr/>
           </p:nvSpPr>
           <p:spPr>
             <a:xfrm>
-              <a:off x="3386118" y="1622891"/>
-              <a:ext cx="1740364" cy="373386"/>
+              <a:off x="0" y="1979924"/>
+              <a:ext cx="2281133" cy="1"/>
             </a:xfrm>
-            <a:prstGeom prst="rect">
+            <a:prstGeom prst="line">
               <a:avLst/>
             </a:prstGeom>
-            <a:solidFill>
-              <a:srgbClr val="00D2A9"/>
-            </a:solidFill>
-            <a:ln w="9525" cap="flat">
+            <a:noFill/>
+            <a:ln w="25400" cap="flat">
               <a:solidFill>
                 <a:srgbClr val="000000"/>
               </a:solidFill>
@@ -10255,440 +10523,7 @@
             <a:effectLst/>
           </p:spPr>
           <p:txBody>
-            <a:bodyPr wrap="square" lIns="50800" tIns="50800" rIns="50800" bIns="50800" numCol="1" anchor="ctr">
-              <a:noAutofit/>
-            </a:bodyPr>
-            <a:lstStyle/>
-            <a:p>
-              <a:pPr/>
-            </a:p>
-          </p:txBody>
-        </p:sp>
-        <p:grpSp>
-          <p:nvGrpSpPr>
-            <p:cNvPr id="193" name="Group"/>
-            <p:cNvGrpSpPr/>
-            <p:nvPr/>
-          </p:nvGrpSpPr>
-          <p:grpSpPr>
-            <a:xfrm>
-              <a:off x="0" y="-1"/>
-              <a:ext cx="2281133" cy="1979926"/>
-              <a:chOff x="0" y="0"/>
-              <a:chExt cx="2281132" cy="1979924"/>
-            </a:xfrm>
-          </p:grpSpPr>
-          <p:sp>
-            <p:nvSpPr>
-              <p:cNvPr id="191" name="Line"/>
-              <p:cNvSpPr/>
-              <p:nvPr/>
-            </p:nvSpPr>
-            <p:spPr>
-              <a:xfrm>
-                <a:off x="0" y="1979924"/>
-                <a:ext cx="2281133" cy="1"/>
-              </a:xfrm>
-              <a:prstGeom prst="line">
-                <a:avLst/>
-              </a:prstGeom>
-              <a:noFill/>
-              <a:ln w="25400" cap="flat">
-                <a:solidFill>
-                  <a:srgbClr val="000000"/>
-                </a:solidFill>
-                <a:prstDash val="solid"/>
-                <a:round/>
-              </a:ln>
-              <a:effectLst/>
-            </p:spPr>
-            <p:txBody>
-              <a:bodyPr wrap="square" lIns="0" tIns="0" rIns="0" bIns="0" numCol="1" anchor="t">
-                <a:noAutofit/>
-              </a:bodyPr>
-              <a:lstStyle/>
-              <a:p>
-                <a:pPr/>
-              </a:p>
-            </p:txBody>
-          </p:sp>
-          <p:sp>
-            <p:nvSpPr>
-              <p:cNvPr id="192" name="Line"/>
-              <p:cNvSpPr/>
-              <p:nvPr/>
-            </p:nvSpPr>
-            <p:spPr>
-              <a:xfrm flipV="1">
-                <a:off x="1140566" y="-1"/>
-                <a:ext cx="1" cy="1971459"/>
-              </a:xfrm>
-              <a:prstGeom prst="line">
-                <a:avLst/>
-              </a:prstGeom>
-              <a:noFill/>
-              <a:ln w="25400" cap="flat">
-                <a:solidFill>
-                  <a:srgbClr val="000000"/>
-                </a:solidFill>
-                <a:prstDash val="solid"/>
-                <a:round/>
-              </a:ln>
-              <a:effectLst/>
-            </p:spPr>
-            <p:txBody>
-              <a:bodyPr wrap="square" lIns="0" tIns="0" rIns="0" bIns="0" numCol="1" anchor="t">
-                <a:noAutofit/>
-              </a:bodyPr>
-              <a:lstStyle/>
-              <a:p>
-                <a:pPr/>
-              </a:p>
-            </p:txBody>
-          </p:sp>
-        </p:grpSp>
-        <p:grpSp>
-          <p:nvGrpSpPr>
-            <p:cNvPr id="196" name="Group"/>
-            <p:cNvGrpSpPr/>
-            <p:nvPr/>
-          </p:nvGrpSpPr>
-          <p:grpSpPr>
-            <a:xfrm>
-              <a:off x="3115733" y="-1"/>
-              <a:ext cx="2281134" cy="1979926"/>
-              <a:chOff x="0" y="0"/>
-              <a:chExt cx="2281132" cy="1979924"/>
-            </a:xfrm>
-          </p:grpSpPr>
-          <p:sp>
-            <p:nvSpPr>
-              <p:cNvPr id="194" name="Line"/>
-              <p:cNvSpPr/>
-              <p:nvPr/>
-            </p:nvSpPr>
-            <p:spPr>
-              <a:xfrm>
-                <a:off x="0" y="1979924"/>
-                <a:ext cx="2281133" cy="1"/>
-              </a:xfrm>
-              <a:prstGeom prst="line">
-                <a:avLst/>
-              </a:prstGeom>
-              <a:noFill/>
-              <a:ln w="25400" cap="flat">
-                <a:solidFill>
-                  <a:srgbClr val="000000"/>
-                </a:solidFill>
-                <a:prstDash val="solid"/>
-                <a:round/>
-              </a:ln>
-              <a:effectLst/>
-            </p:spPr>
-            <p:txBody>
-              <a:bodyPr wrap="square" lIns="0" tIns="0" rIns="0" bIns="0" numCol="1" anchor="t">
-                <a:noAutofit/>
-              </a:bodyPr>
-              <a:lstStyle/>
-              <a:p>
-                <a:pPr/>
-              </a:p>
-            </p:txBody>
-          </p:sp>
-          <p:sp>
-            <p:nvSpPr>
-              <p:cNvPr id="195" name="Line"/>
-              <p:cNvSpPr/>
-              <p:nvPr/>
-            </p:nvSpPr>
-            <p:spPr>
-              <a:xfrm flipV="1">
-                <a:off x="1140566" y="-1"/>
-                <a:ext cx="1" cy="1971459"/>
-              </a:xfrm>
-              <a:prstGeom prst="line">
-                <a:avLst/>
-              </a:prstGeom>
-              <a:noFill/>
-              <a:ln w="25400" cap="flat">
-                <a:solidFill>
-                  <a:srgbClr val="000000"/>
-                </a:solidFill>
-                <a:prstDash val="solid"/>
-                <a:round/>
-              </a:ln>
-              <a:effectLst/>
-            </p:spPr>
-            <p:txBody>
-              <a:bodyPr wrap="square" lIns="0" tIns="0" rIns="0" bIns="0" numCol="1" anchor="t">
-                <a:noAutofit/>
-              </a:bodyPr>
-              <a:lstStyle/>
-              <a:p>
-                <a:pPr/>
-              </a:p>
-            </p:txBody>
-          </p:sp>
-        </p:grpSp>
-        <p:grpSp>
-          <p:nvGrpSpPr>
-            <p:cNvPr id="199" name="Group"/>
-            <p:cNvGrpSpPr/>
-            <p:nvPr/>
-          </p:nvGrpSpPr>
-          <p:grpSpPr>
-            <a:xfrm>
-              <a:off x="6231466" y="-1"/>
-              <a:ext cx="2281134" cy="1979926"/>
-              <a:chOff x="0" y="0"/>
-              <a:chExt cx="2281132" cy="1979924"/>
-            </a:xfrm>
-          </p:grpSpPr>
-          <p:sp>
-            <p:nvSpPr>
-              <p:cNvPr id="197" name="Line"/>
-              <p:cNvSpPr/>
-              <p:nvPr/>
-            </p:nvSpPr>
-            <p:spPr>
-              <a:xfrm>
-                <a:off x="0" y="1979924"/>
-                <a:ext cx="2281133" cy="1"/>
-              </a:xfrm>
-              <a:prstGeom prst="line">
-                <a:avLst/>
-              </a:prstGeom>
-              <a:noFill/>
-              <a:ln w="25400" cap="flat">
-                <a:solidFill>
-                  <a:srgbClr val="000000"/>
-                </a:solidFill>
-                <a:prstDash val="solid"/>
-                <a:round/>
-              </a:ln>
-              <a:effectLst/>
-            </p:spPr>
-            <p:txBody>
-              <a:bodyPr wrap="square" lIns="0" tIns="0" rIns="0" bIns="0" numCol="1" anchor="t">
-                <a:noAutofit/>
-              </a:bodyPr>
-              <a:lstStyle/>
-              <a:p>
-                <a:pPr/>
-              </a:p>
-            </p:txBody>
-          </p:sp>
-          <p:sp>
-            <p:nvSpPr>
-              <p:cNvPr id="198" name="Line"/>
-              <p:cNvSpPr/>
-              <p:nvPr/>
-            </p:nvSpPr>
-            <p:spPr>
-              <a:xfrm flipV="1">
-                <a:off x="1140566" y="-1"/>
-                <a:ext cx="1" cy="1971459"/>
-              </a:xfrm>
-              <a:prstGeom prst="line">
-                <a:avLst/>
-              </a:prstGeom>
-              <a:noFill/>
-              <a:ln w="25400" cap="flat">
-                <a:solidFill>
-                  <a:srgbClr val="000000"/>
-                </a:solidFill>
-                <a:prstDash val="solid"/>
-                <a:round/>
-              </a:ln>
-              <a:effectLst/>
-            </p:spPr>
-            <p:txBody>
-              <a:bodyPr wrap="square" lIns="0" tIns="0" rIns="0" bIns="0" numCol="1" anchor="t">
-                <a:noAutofit/>
-              </a:bodyPr>
-              <a:lstStyle/>
-              <a:p>
-                <a:pPr/>
-              </a:p>
-            </p:txBody>
-          </p:sp>
-        </p:grpSp>
-        <p:sp>
-          <p:nvSpPr>
-            <p:cNvPr id="200" name="Tower A"/>
-            <p:cNvSpPr txBox="1"/>
-            <p:nvPr/>
-          </p:nvSpPr>
-          <p:spPr>
-            <a:xfrm>
-              <a:off x="412531" y="1952407"/>
-              <a:ext cx="1456071" cy="546101"/>
-            </a:xfrm>
-            <a:prstGeom prst="rect">
-              <a:avLst/>
-            </a:prstGeom>
-            <a:noFill/>
-            <a:ln w="12700" cap="flat">
-              <a:noFill/>
-              <a:miter lim="400000"/>
-            </a:ln>
-            <a:effectLst/>
-            <a:extLst>
-              <a:ext uri="{C572A759-6A51-4108-AA02-DFA0A04FC94B}">
-                <ma14:wrappingTextBoxFlag xmlns:ma14="http://schemas.microsoft.com/office/mac/drawingml/2011/main" val="1"/>
-              </a:ext>
-            </a:extLst>
-          </p:spPr>
-          <p:txBody>
-            <a:bodyPr wrap="none" lIns="50800" tIns="50800" rIns="50800" bIns="50800" numCol="1" anchor="ctr">
-              <a:spAutoFit/>
-            </a:bodyPr>
-            <a:lstStyle>
-              <a:lvl1pPr>
-                <a:defRPr sz="3000">
-                  <a:latin typeface="Gill Sans MT"/>
-                  <a:ea typeface="Gill Sans MT"/>
-                  <a:cs typeface="Gill Sans MT"/>
-                  <a:sym typeface="Gill Sans MT"/>
-                </a:defRPr>
-              </a:lvl1pPr>
-            </a:lstStyle>
-            <a:p>
-              <a:pPr/>
-              <a:r>
-                <a:t>Tower A</a:t>
-              </a:r>
-            </a:p>
-          </p:txBody>
-        </p:sp>
-        <p:sp>
-          <p:nvSpPr>
-            <p:cNvPr id="201" name="Tower B"/>
-            <p:cNvSpPr txBox="1"/>
-            <p:nvPr/>
-          </p:nvSpPr>
-          <p:spPr>
-            <a:xfrm>
-              <a:off x="3528264" y="1952407"/>
-              <a:ext cx="1454583" cy="546101"/>
-            </a:xfrm>
-            <a:prstGeom prst="rect">
-              <a:avLst/>
-            </a:prstGeom>
-            <a:noFill/>
-            <a:ln w="12700" cap="flat">
-              <a:noFill/>
-              <a:miter lim="400000"/>
-            </a:ln>
-            <a:effectLst/>
-            <a:extLst>
-              <a:ext uri="{C572A759-6A51-4108-AA02-DFA0A04FC94B}">
-                <ma14:wrappingTextBoxFlag xmlns:ma14="http://schemas.microsoft.com/office/mac/drawingml/2011/main" val="1"/>
-              </a:ext>
-            </a:extLst>
-          </p:spPr>
-          <p:txBody>
-            <a:bodyPr wrap="none" lIns="50800" tIns="50800" rIns="50800" bIns="50800" numCol="1" anchor="ctr">
-              <a:spAutoFit/>
-            </a:bodyPr>
-            <a:lstStyle>
-              <a:lvl1pPr>
-                <a:defRPr sz="3000">
-                  <a:latin typeface="Gill Sans MT"/>
-                  <a:ea typeface="Gill Sans MT"/>
-                  <a:cs typeface="Gill Sans MT"/>
-                  <a:sym typeface="Gill Sans MT"/>
-                </a:defRPr>
-              </a:lvl1pPr>
-            </a:lstStyle>
-            <a:p>
-              <a:pPr/>
-              <a:r>
-                <a:t>Tower B</a:t>
-              </a:r>
-            </a:p>
-          </p:txBody>
-        </p:sp>
-        <p:sp>
-          <p:nvSpPr>
-            <p:cNvPr id="202" name="Tower C"/>
-            <p:cNvSpPr txBox="1"/>
-            <p:nvPr/>
-          </p:nvSpPr>
-          <p:spPr>
-            <a:xfrm>
-              <a:off x="6639765" y="1901607"/>
-              <a:ext cx="1509835" cy="546101"/>
-            </a:xfrm>
-            <a:prstGeom prst="rect">
-              <a:avLst/>
-            </a:prstGeom>
-            <a:noFill/>
-            <a:ln w="12700" cap="flat">
-              <a:noFill/>
-              <a:miter lim="400000"/>
-            </a:ln>
-            <a:effectLst/>
-            <a:extLst>
-              <a:ext uri="{C572A759-6A51-4108-AA02-DFA0A04FC94B}">
-                <ma14:wrappingTextBoxFlag xmlns:ma14="http://schemas.microsoft.com/office/mac/drawingml/2011/main" val="1"/>
-              </a:ext>
-            </a:extLst>
-          </p:spPr>
-          <p:txBody>
-            <a:bodyPr wrap="none" lIns="50800" tIns="50800" rIns="50800" bIns="50800" numCol="1" anchor="ctr">
-              <a:spAutoFit/>
-            </a:bodyPr>
-            <a:lstStyle>
-              <a:lvl1pPr>
-                <a:defRPr sz="3000">
-                  <a:latin typeface="Gill Sans MT"/>
-                  <a:ea typeface="Gill Sans MT"/>
-                  <a:cs typeface="Gill Sans MT"/>
-                  <a:sym typeface="Gill Sans MT"/>
-                </a:defRPr>
-              </a:lvl1pPr>
-            </a:lstStyle>
-            <a:p>
-              <a:pPr/>
-              <a:r>
-                <a:t>Tower C</a:t>
-              </a:r>
-            </a:p>
-          </p:txBody>
-        </p:sp>
-        <p:sp>
-          <p:nvSpPr>
-            <p:cNvPr id="203" name="Rectangle"/>
-            <p:cNvSpPr/>
-            <p:nvPr/>
-          </p:nvSpPr>
-          <p:spPr>
-            <a:xfrm>
-              <a:off x="6795670" y="1622891"/>
-              <a:ext cx="1152728" cy="373386"/>
-            </a:xfrm>
-            <a:prstGeom prst="rect">
-              <a:avLst/>
-            </a:prstGeom>
-            <a:solidFill>
-              <a:schemeClr val="accent5">
-                <a:hueOff val="-444211"/>
-                <a:satOff val="-14915"/>
-                <a:lumOff val="22857"/>
-              </a:schemeClr>
-            </a:solidFill>
-            <a:ln w="9525" cap="flat">
-              <a:solidFill>
-                <a:srgbClr val="000000"/>
-              </a:solidFill>
-              <a:prstDash val="solid"/>
-              <a:round/>
-            </a:ln>
-            <a:effectLst/>
-          </p:spPr>
-          <p:txBody>
-            <a:bodyPr wrap="square" lIns="50800" tIns="50800" rIns="50800" bIns="50800" numCol="1" anchor="ctr">
+            <a:bodyPr wrap="square" lIns="0" tIns="0" rIns="0" bIns="0" numCol="1" anchor="t">
               <a:noAutofit/>
             </a:bodyPr>
             <a:lstStyle/>
@@ -10699,25 +10534,20 @@
         </p:sp>
         <p:sp>
           <p:nvSpPr>
-            <p:cNvPr id="204" name="Rectangle"/>
+            <p:cNvPr id="192" name="Line"/>
             <p:cNvSpPr/>
             <p:nvPr/>
           </p:nvSpPr>
           <p:spPr>
-            <a:xfrm>
-              <a:off x="7177066" y="581491"/>
-              <a:ext cx="391191" cy="373386"/>
+            <a:xfrm flipV="1">
+              <a:off x="1140566" y="-1"/>
+              <a:ext cx="1" cy="1971459"/>
             </a:xfrm>
-            <a:prstGeom prst="rect">
+            <a:prstGeom prst="line">
               <a:avLst/>
             </a:prstGeom>
-            <a:solidFill>
-              <a:schemeClr val="accent6">
-                <a:satOff val="24555"/>
-                <a:lumOff val="22232"/>
-              </a:schemeClr>
-            </a:solidFill>
-            <a:ln w="9525" cap="flat">
+            <a:noFill/>
+            <a:ln w="25400" cap="flat">
               <a:solidFill>
                 <a:srgbClr val="000000"/>
               </a:solidFill>
@@ -10727,7 +10557,56 @@
             <a:effectLst/>
           </p:spPr>
           <p:txBody>
-            <a:bodyPr wrap="square" lIns="50800" tIns="50800" rIns="50800" bIns="50800" numCol="1" anchor="ctr">
+            <a:bodyPr wrap="square" lIns="0" tIns="0" rIns="0" bIns="0" numCol="1" anchor="t">
+              <a:noAutofit/>
+            </a:bodyPr>
+            <a:lstStyle/>
+            <a:p>
+              <a:pPr/>
+            </a:p>
+          </p:txBody>
+        </p:sp>
+      </p:grpSp>
+      <p:grpSp>
+        <p:nvGrpSpPr>
+          <p:cNvPr id="196" name="Group"/>
+          <p:cNvGrpSpPr/>
+          <p:nvPr/>
+        </p:nvGrpSpPr>
+        <p:grpSpPr>
+          <a:xfrm>
+            <a:off x="3939434" y="1364408"/>
+            <a:ext cx="2281133" cy="1979926"/>
+            <a:chOff x="0" y="0"/>
+            <a:chExt cx="2281132" cy="1979924"/>
+          </a:xfrm>
+        </p:grpSpPr>
+        <p:sp>
+          <p:nvSpPr>
+            <p:cNvPr id="194" name="Line"/>
+            <p:cNvSpPr/>
+            <p:nvPr/>
+          </p:nvSpPr>
+          <p:spPr>
+            <a:xfrm>
+              <a:off x="0" y="1979924"/>
+              <a:ext cx="2281133" cy="1"/>
+            </a:xfrm>
+            <a:prstGeom prst="line">
+              <a:avLst/>
+            </a:prstGeom>
+            <a:noFill/>
+            <a:ln w="25400" cap="flat">
+              <a:solidFill>
+                <a:srgbClr val="000000"/>
+              </a:solidFill>
+              <a:prstDash val="solid"/>
+              <a:round/>
+            </a:ln>
+            <a:effectLst/>
+          </p:spPr>
+          <p:txBody>
+            <a:bodyPr wrap="square" lIns="0" tIns="0" rIns="0" bIns="0" numCol="1" anchor="t">
               <a:noAutofit/>
             </a:bodyPr>
             <a:lstStyle/>
@@ -10738,27 +10617,108 @@
         </p:sp>
         <p:sp>
           <p:nvSpPr>
-            <p:cNvPr id="205" name="Line"/>
+            <p:cNvPr id="195" name="Line"/>
             <p:cNvSpPr/>
             <p:nvPr/>
           </p:nvSpPr>
           <p:spPr>
             <a:xfrm flipV="1">
-              <a:off x="7568651" y="1056536"/>
-              <a:ext cx="1" cy="431553"/>
+              <a:off x="1140566" y="-1"/>
+              <a:ext cx="1" cy="1971459"/>
             </a:xfrm>
             <a:prstGeom prst="line">
               <a:avLst/>
             </a:prstGeom>
             <a:noFill/>
-            <a:ln w="38100" cap="flat">
+            <a:ln w="25400" cap="flat">
               <a:solidFill>
                 <a:srgbClr val="000000"/>
               </a:solidFill>
-              <a:custDash>
-                <a:ds d="200000" sp="200000"/>
-              </a:custDash>
-              <a:miter lim="400000"/>
+              <a:prstDash val="solid"/>
+              <a:round/>
+            </a:ln>
+            <a:effectLst/>
+          </p:spPr>
+          <p:txBody>
+            <a:bodyPr wrap="square" lIns="0" tIns="0" rIns="0" bIns="0" numCol="1" anchor="t">
+              <a:noAutofit/>
+            </a:bodyPr>
+            <a:lstStyle/>
+            <a:p>
+              <a:pPr/>
+            </a:p>
+          </p:txBody>
+        </p:sp>
+      </p:grpSp>
+      <p:grpSp>
+        <p:nvGrpSpPr>
+          <p:cNvPr id="199" name="Group"/>
+          <p:cNvGrpSpPr/>
+          <p:nvPr/>
+        </p:nvGrpSpPr>
+        <p:grpSpPr>
+          <a:xfrm>
+            <a:off x="7055167" y="1364408"/>
+            <a:ext cx="2281133" cy="1979926"/>
+            <a:chOff x="0" y="0"/>
+            <a:chExt cx="2281132" cy="1979924"/>
+          </a:xfrm>
+        </p:grpSpPr>
+        <p:sp>
+          <p:nvSpPr>
+            <p:cNvPr id="197" name="Line"/>
+            <p:cNvSpPr/>
+            <p:nvPr/>
+          </p:nvSpPr>
+          <p:spPr>
+            <a:xfrm>
+              <a:off x="0" y="1979924"/>
+              <a:ext cx="2281133" cy="1"/>
+            </a:xfrm>
+            <a:prstGeom prst="line">
+              <a:avLst/>
+            </a:prstGeom>
+            <a:noFill/>
+            <a:ln w="25400" cap="flat">
+              <a:solidFill>
+                <a:srgbClr val="000000"/>
+              </a:solidFill>
+              <a:prstDash val="solid"/>
+              <a:round/>
+            </a:ln>
+            <a:effectLst/>
+          </p:spPr>
+          <p:txBody>
+            <a:bodyPr wrap="square" lIns="0" tIns="0" rIns="0" bIns="0" numCol="1" anchor="t">
+              <a:noAutofit/>
+            </a:bodyPr>
+            <a:lstStyle/>
+            <a:p>
+              <a:pPr/>
+            </a:p>
+          </p:txBody>
+        </p:sp>
+        <p:sp>
+          <p:nvSpPr>
+            <p:cNvPr id="198" name="Line"/>
+            <p:cNvSpPr/>
+            <p:nvPr/>
+          </p:nvSpPr>
+          <p:spPr>
+            <a:xfrm flipV="1">
+              <a:off x="1140566" y="-1"/>
+              <a:ext cx="1" cy="1971459"/>
+            </a:xfrm>
+            <a:prstGeom prst="line">
+              <a:avLst/>
+            </a:prstGeom>
+            <a:noFill/>
+            <a:ln w="25400" cap="flat">
+              <a:solidFill>
+                <a:srgbClr val="000000"/>
+              </a:solidFill>
+              <a:prstDash val="solid"/>
+              <a:round/>
             </a:ln>
             <a:effectLst/>
           </p:spPr>
@@ -10775,7 +10735,243 @@
       </p:grpSp>
       <p:sp>
         <p:nvSpPr>
-          <p:cNvPr id="207" name="Step 3: N-1 discs from C to B using A"/>
+          <p:cNvPr id="200" name="Tower A"/>
+          <p:cNvSpPr txBox="1"/>
+          <p:nvPr/>
+        </p:nvSpPr>
+        <p:spPr>
+          <a:xfrm>
+            <a:off x="1236231" y="3316816"/>
+            <a:ext cx="1456071" cy="546101"/>
+          </a:xfrm>
+          <a:prstGeom prst="rect">
+            <a:avLst/>
+          </a:prstGeom>
+          <a:ln w="12700">
+            <a:miter lim="400000"/>
+          </a:ln>
+          <a:extLst>
+            <a:ext uri="{C572A759-6A51-4108-AA02-DFA0A04FC94B}">
+              <ma14:wrappingTextBoxFlag xmlns:ma14="http://schemas.microsoft.com/office/mac/drawingml/2011/main" val="1"/>
+            </a:ext>
+          </a:extLst>
+        </p:spPr>
+        <p:txBody>
+          <a:bodyPr wrap="none" lIns="50800" tIns="50800" rIns="50800" bIns="50800" anchor="ctr">
+            <a:spAutoFit/>
+          </a:bodyPr>
+          <a:lstStyle>
+            <a:lvl1pPr>
+              <a:defRPr sz="3000">
+                <a:latin typeface="Gill Sans MT"/>
+                <a:ea typeface="Gill Sans MT"/>
+                <a:cs typeface="Gill Sans MT"/>
+                <a:sym typeface="Gill Sans MT"/>
+              </a:defRPr>
+            </a:lvl1pPr>
+          </a:lstStyle>
+          <a:p>
+            <a:pPr/>
+            <a:r>
+              <a:t>Tower A</a:t>
+            </a:r>
+          </a:p>
+        </p:txBody>
+      </p:sp>
+      <p:sp>
+        <p:nvSpPr>
+          <p:cNvPr id="201" name="Tower B"/>
+          <p:cNvSpPr txBox="1"/>
+          <p:nvPr/>
+        </p:nvSpPr>
+        <p:spPr>
+          <a:xfrm>
+            <a:off x="4351965" y="3316816"/>
+            <a:ext cx="1454582" cy="546101"/>
+          </a:xfrm>
+          <a:prstGeom prst="rect">
+            <a:avLst/>
+          </a:prstGeom>
+          <a:ln w="12700">
+            <a:miter lim="400000"/>
+          </a:ln>
+          <a:extLst>
+            <a:ext uri="{C572A759-6A51-4108-AA02-DFA0A04FC94B}">
+              <ma14:wrappingTextBoxFlag xmlns:ma14="http://schemas.microsoft.com/office/mac/drawingml/2011/main" val="1"/>
+            </a:ext>
+          </a:extLst>
+        </p:spPr>
+        <p:txBody>
+          <a:bodyPr wrap="none" lIns="50800" tIns="50800" rIns="50800" bIns="50800" anchor="ctr">
+            <a:spAutoFit/>
+          </a:bodyPr>
+          <a:lstStyle>
+            <a:lvl1pPr>
+              <a:defRPr sz="3000">
+                <a:latin typeface="Gill Sans MT"/>
+                <a:ea typeface="Gill Sans MT"/>
+                <a:cs typeface="Gill Sans MT"/>
+                <a:sym typeface="Gill Sans MT"/>
+              </a:defRPr>
+            </a:lvl1pPr>
+          </a:lstStyle>
+          <a:p>
+            <a:pPr/>
+            <a:r>
+              <a:t>Tower B</a:t>
+            </a:r>
+          </a:p>
+        </p:txBody>
+      </p:sp>
+      <p:sp>
+        <p:nvSpPr>
+          <p:cNvPr id="202" name="Tower C"/>
+          <p:cNvSpPr txBox="1"/>
+          <p:nvPr/>
+        </p:nvSpPr>
+        <p:spPr>
+          <a:xfrm>
+            <a:off x="7463465" y="3266016"/>
+            <a:ext cx="1509835" cy="546101"/>
+          </a:xfrm>
+          <a:prstGeom prst="rect">
+            <a:avLst/>
+          </a:prstGeom>
+          <a:ln w="12700">
+            <a:miter lim="400000"/>
+          </a:ln>
+          <a:extLst>
+            <a:ext uri="{C572A759-6A51-4108-AA02-DFA0A04FC94B}">
+              <ma14:wrappingTextBoxFlag xmlns:ma14="http://schemas.microsoft.com/office/mac/drawingml/2011/main" val="1"/>
+            </a:ext>
+          </a:extLst>
+        </p:spPr>
+        <p:txBody>
+          <a:bodyPr wrap="none" lIns="50800" tIns="50800" rIns="50800" bIns="50800" anchor="ctr">
+            <a:spAutoFit/>
+          </a:bodyPr>
+          <a:lstStyle>
+            <a:lvl1pPr>
+              <a:defRPr sz="3000">
+                <a:latin typeface="Gill Sans MT"/>
+                <a:ea typeface="Gill Sans MT"/>
+                <a:cs typeface="Gill Sans MT"/>
+                <a:sym typeface="Gill Sans MT"/>
+              </a:defRPr>
+            </a:lvl1pPr>
+          </a:lstStyle>
+          <a:p>
+            <a:pPr/>
+            <a:r>
+              <a:t>Tower C</a:t>
+            </a:r>
+          </a:p>
+        </p:txBody>
+      </p:sp>
+      <p:sp>
+        <p:nvSpPr>
+          <p:cNvPr id="203" name="Rectangle"/>
+          <p:cNvSpPr/>
+          <p:nvPr/>
+        </p:nvSpPr>
+        <p:spPr>
+          <a:xfrm>
+            <a:off x="7619370" y="2987300"/>
+            <a:ext cx="1152728" cy="373386"/>
+          </a:xfrm>
+          <a:prstGeom prst="rect">
+            <a:avLst/>
+          </a:prstGeom>
+          <a:solidFill>
+            <a:schemeClr val="accent5">
+              <a:hueOff val="-444211"/>
+              <a:satOff val="-14915"/>
+              <a:lumOff val="22857"/>
+            </a:schemeClr>
+          </a:solidFill>
+          <a:ln>
+            <a:solidFill>
+              <a:srgbClr val="000000"/>
+            </a:solidFill>
+          </a:ln>
+        </p:spPr>
+        <p:txBody>
+          <a:bodyPr lIns="50800" tIns="50800" rIns="50800" bIns="50800" anchor="ctr"/>
+          <a:lstStyle/>
+          <a:p>
+            <a:pPr/>
+          </a:p>
+        </p:txBody>
+      </p:sp>
+      <p:sp>
+        <p:nvSpPr>
+          <p:cNvPr id="204" name="Rectangle"/>
+          <p:cNvSpPr/>
+          <p:nvPr/>
+        </p:nvSpPr>
+        <p:spPr>
+          <a:xfrm>
+            <a:off x="8000766" y="1945900"/>
+            <a:ext cx="391191" cy="373386"/>
+          </a:xfrm>
+          <a:prstGeom prst="rect">
+            <a:avLst/>
+          </a:prstGeom>
+          <a:solidFill>
+            <a:schemeClr val="accent6">
+              <a:satOff val="24555"/>
+              <a:lumOff val="22232"/>
+            </a:schemeClr>
+          </a:solidFill>
+          <a:ln>
+            <a:solidFill>
+              <a:srgbClr val="000000"/>
+            </a:solidFill>
+          </a:ln>
+        </p:spPr>
+        <p:txBody>
+          <a:bodyPr lIns="50800" tIns="50800" rIns="50800" bIns="50800" anchor="ctr"/>
+          <a:lstStyle/>
+          <a:p>
+            <a:pPr/>
+          </a:p>
+        </p:txBody>
+      </p:sp>
+      <p:sp>
+        <p:nvSpPr>
+          <p:cNvPr id="205" name="Line"/>
+          <p:cNvSpPr/>
+          <p:nvPr/>
+        </p:nvSpPr>
+        <p:spPr>
+          <a:xfrm flipV="1">
+            <a:off x="8392352" y="2420945"/>
+            <a:ext cx="1" cy="431553"/>
+          </a:xfrm>
+          <a:prstGeom prst="line">
+            <a:avLst/>
+          </a:prstGeom>
+          <a:ln w="38100">
+            <a:solidFill>
+              <a:srgbClr val="000000"/>
+            </a:solidFill>
+            <a:custDash>
+              <a:ds d="200000" sp="200000"/>
+            </a:custDash>
+            <a:miter lim="400000"/>
+          </a:ln>
+        </p:spPr>
+        <p:txBody>
+          <a:bodyPr lIns="0" tIns="0" rIns="0" bIns="0"/>
+          <a:lstStyle/>
+          <a:p>
+            <a:pPr/>
+          </a:p>
+        </p:txBody>
+      </p:sp>
+      <p:sp>
+        <p:nvSpPr>
+          <p:cNvPr id="206" name="Step 3: N-1 discs from C to B using A"/>
           <p:cNvSpPr txBox="1"/>
           <p:nvPr/>
         </p:nvSpPr>
@@ -10824,38 +11020,67 @@
           </a:p>
         </p:txBody>
       </p:sp>
+      <p:sp>
+        <p:nvSpPr>
+          <p:cNvPr id="207" name="Rectangle"/>
+          <p:cNvSpPr/>
+          <p:nvPr/>
+        </p:nvSpPr>
+        <p:spPr>
+          <a:xfrm>
+            <a:off x="4209818" y="5988716"/>
+            <a:ext cx="1740364" cy="373386"/>
+          </a:xfrm>
+          <a:prstGeom prst="rect">
+            <a:avLst/>
+          </a:prstGeom>
+          <a:solidFill>
+            <a:srgbClr val="00D2A9"/>
+          </a:solidFill>
+          <a:ln>
+            <a:solidFill>
+              <a:srgbClr val="000000"/>
+            </a:solidFill>
+          </a:ln>
+        </p:spPr>
+        <p:txBody>
+          <a:bodyPr lIns="50800" tIns="50800" rIns="50800" bIns="50800" anchor="ctr"/>
+          <a:lstStyle/>
+          <a:p>
+            <a:pPr/>
+          </a:p>
+        </p:txBody>
+      </p:sp>
       <p:grpSp>
         <p:nvGrpSpPr>
-          <p:cNvPr id="224" name="Group"/>
+          <p:cNvPr id="210" name="Group"/>
           <p:cNvGrpSpPr/>
           <p:nvPr/>
         </p:nvGrpSpPr>
         <p:grpSpPr>
           <a:xfrm>
             <a:off x="823700" y="4365824"/>
-            <a:ext cx="8512600" cy="2498509"/>
+            <a:ext cx="2281134" cy="1979926"/>
             <a:chOff x="0" y="0"/>
-            <a:chExt cx="8512599" cy="2498507"/>
+            <a:chExt cx="2281132" cy="1979924"/>
           </a:xfrm>
         </p:grpSpPr>
         <p:sp>
           <p:nvSpPr>
-            <p:cNvPr id="208" name="Rectangle"/>
+            <p:cNvPr id="208" name="Line"/>
             <p:cNvSpPr/>
             <p:nvPr/>
           </p:nvSpPr>
           <p:spPr>
             <a:xfrm>
-              <a:off x="3386118" y="1622892"/>
-              <a:ext cx="1740364" cy="373385"/>
+              <a:off x="0" y="1979924"/>
+              <a:ext cx="2281133" cy="1"/>
             </a:xfrm>
-            <a:prstGeom prst="rect">
+            <a:prstGeom prst="line">
               <a:avLst/>
             </a:prstGeom>
-            <a:solidFill>
-              <a:srgbClr val="00D2A9"/>
-            </a:solidFill>
-            <a:ln w="9525" cap="flat">
+            <a:noFill/>
+            <a:ln w="25400" cap="flat">
               <a:solidFill>
                 <a:srgbClr val="000000"/>
               </a:solidFill>
@@ -10865,7 +11090,7 @@
             <a:effectLst/>
           </p:spPr>
           <p:txBody>
-            <a:bodyPr wrap="square" lIns="50800" tIns="50800" rIns="50800" bIns="50800" numCol="1" anchor="ctr">
+            <a:bodyPr wrap="square" lIns="0" tIns="0" rIns="0" bIns="0" numCol="1" anchor="t">
               <a:noAutofit/>
             </a:bodyPr>
             <a:lstStyle/>
@@ -10874,409 +11099,366 @@
             </a:p>
           </p:txBody>
         </p:sp>
-        <p:grpSp>
-          <p:nvGrpSpPr>
-            <p:cNvPr id="211" name="Group"/>
-            <p:cNvGrpSpPr/>
-            <p:nvPr/>
-          </p:nvGrpSpPr>
-          <p:grpSpPr>
-            <a:xfrm>
-              <a:off x="0" y="-1"/>
-              <a:ext cx="2281133" cy="1979926"/>
-              <a:chOff x="0" y="0"/>
-              <a:chExt cx="2281132" cy="1979924"/>
-            </a:xfrm>
-          </p:grpSpPr>
-          <p:sp>
-            <p:nvSpPr>
-              <p:cNvPr id="209" name="Line"/>
-              <p:cNvSpPr/>
-              <p:nvPr/>
-            </p:nvSpPr>
-            <p:spPr>
-              <a:xfrm>
-                <a:off x="0" y="1979924"/>
-                <a:ext cx="2281133" cy="1"/>
-              </a:xfrm>
-              <a:prstGeom prst="line">
-                <a:avLst/>
-              </a:prstGeom>
-              <a:noFill/>
-              <a:ln w="25400" cap="flat">
-                <a:solidFill>
-                  <a:srgbClr val="000000"/>
-                </a:solidFill>
-                <a:prstDash val="solid"/>
-                <a:round/>
-              </a:ln>
-              <a:effectLst/>
-            </p:spPr>
-            <p:txBody>
-              <a:bodyPr wrap="square" lIns="0" tIns="0" rIns="0" bIns="0" numCol="1" anchor="t">
-                <a:noAutofit/>
-              </a:bodyPr>
-              <a:lstStyle/>
-              <a:p>
-                <a:pPr/>
-              </a:p>
-            </p:txBody>
-          </p:sp>
-          <p:sp>
-            <p:nvSpPr>
-              <p:cNvPr id="210" name="Line"/>
-              <p:cNvSpPr/>
-              <p:nvPr/>
-            </p:nvSpPr>
-            <p:spPr>
-              <a:xfrm flipV="1">
-                <a:off x="1140566" y="-1"/>
-                <a:ext cx="1" cy="1971459"/>
-              </a:xfrm>
-              <a:prstGeom prst="line">
-                <a:avLst/>
-              </a:prstGeom>
-              <a:noFill/>
-              <a:ln w="25400" cap="flat">
-                <a:solidFill>
-                  <a:srgbClr val="000000"/>
-                </a:solidFill>
-                <a:prstDash val="solid"/>
-                <a:round/>
-              </a:ln>
-              <a:effectLst/>
-            </p:spPr>
-            <p:txBody>
-              <a:bodyPr wrap="square" lIns="0" tIns="0" rIns="0" bIns="0" numCol="1" anchor="t">
-                <a:noAutofit/>
-              </a:bodyPr>
-              <a:lstStyle/>
-              <a:p>
-                <a:pPr/>
-              </a:p>
-            </p:txBody>
-          </p:sp>
-        </p:grpSp>
-        <p:grpSp>
-          <p:nvGrpSpPr>
-            <p:cNvPr id="214" name="Group"/>
-            <p:cNvGrpSpPr/>
-            <p:nvPr/>
-          </p:nvGrpSpPr>
-          <p:grpSpPr>
-            <a:xfrm>
-              <a:off x="3115733" y="-1"/>
-              <a:ext cx="2281134" cy="1979926"/>
-              <a:chOff x="0" y="0"/>
-              <a:chExt cx="2281132" cy="1979924"/>
-            </a:xfrm>
-          </p:grpSpPr>
-          <p:sp>
-            <p:nvSpPr>
-              <p:cNvPr id="212" name="Line"/>
-              <p:cNvSpPr/>
-              <p:nvPr/>
-            </p:nvSpPr>
-            <p:spPr>
-              <a:xfrm>
-                <a:off x="0" y="1979924"/>
-                <a:ext cx="2281133" cy="1"/>
-              </a:xfrm>
-              <a:prstGeom prst="line">
-                <a:avLst/>
-              </a:prstGeom>
-              <a:noFill/>
-              <a:ln w="25400" cap="flat">
-                <a:solidFill>
-                  <a:srgbClr val="000000"/>
-                </a:solidFill>
-                <a:prstDash val="solid"/>
-                <a:round/>
-              </a:ln>
-              <a:effectLst/>
-            </p:spPr>
-            <p:txBody>
-              <a:bodyPr wrap="square" lIns="0" tIns="0" rIns="0" bIns="0" numCol="1" anchor="t">
-                <a:noAutofit/>
-              </a:bodyPr>
-              <a:lstStyle/>
-              <a:p>
-                <a:pPr/>
-              </a:p>
-            </p:txBody>
-          </p:sp>
-          <p:sp>
-            <p:nvSpPr>
-              <p:cNvPr id="213" name="Line"/>
-              <p:cNvSpPr/>
-              <p:nvPr/>
-            </p:nvSpPr>
-            <p:spPr>
-              <a:xfrm flipV="1">
-                <a:off x="1140566" y="-1"/>
-                <a:ext cx="1" cy="1971459"/>
-              </a:xfrm>
-              <a:prstGeom prst="line">
-                <a:avLst/>
-              </a:prstGeom>
-              <a:noFill/>
-              <a:ln w="25400" cap="flat">
-                <a:solidFill>
-                  <a:srgbClr val="000000"/>
-                </a:solidFill>
-                <a:prstDash val="solid"/>
-                <a:round/>
-              </a:ln>
-              <a:effectLst/>
-            </p:spPr>
-            <p:txBody>
-              <a:bodyPr wrap="square" lIns="0" tIns="0" rIns="0" bIns="0" numCol="1" anchor="t">
-                <a:noAutofit/>
-              </a:bodyPr>
-              <a:lstStyle/>
-              <a:p>
-                <a:pPr/>
-              </a:p>
-            </p:txBody>
-          </p:sp>
-        </p:grpSp>
-        <p:grpSp>
-          <p:nvGrpSpPr>
-            <p:cNvPr id="217" name="Group"/>
-            <p:cNvGrpSpPr/>
-            <p:nvPr/>
-          </p:nvGrpSpPr>
-          <p:grpSpPr>
-            <a:xfrm>
-              <a:off x="6231466" y="-1"/>
-              <a:ext cx="2281134" cy="1979926"/>
-              <a:chOff x="0" y="0"/>
-              <a:chExt cx="2281132" cy="1979924"/>
-            </a:xfrm>
-          </p:grpSpPr>
-          <p:sp>
-            <p:nvSpPr>
-              <p:cNvPr id="215" name="Line"/>
-              <p:cNvSpPr/>
-              <p:nvPr/>
-            </p:nvSpPr>
-            <p:spPr>
-              <a:xfrm>
-                <a:off x="0" y="1979924"/>
-                <a:ext cx="2281133" cy="1"/>
-              </a:xfrm>
-              <a:prstGeom prst="line">
-                <a:avLst/>
-              </a:prstGeom>
-              <a:noFill/>
-              <a:ln w="25400" cap="flat">
-                <a:solidFill>
-                  <a:srgbClr val="000000"/>
-                </a:solidFill>
-                <a:prstDash val="solid"/>
-                <a:round/>
-              </a:ln>
-              <a:effectLst/>
-            </p:spPr>
-            <p:txBody>
-              <a:bodyPr wrap="square" lIns="0" tIns="0" rIns="0" bIns="0" numCol="1" anchor="t">
-                <a:noAutofit/>
-              </a:bodyPr>
-              <a:lstStyle/>
-              <a:p>
-                <a:pPr/>
-              </a:p>
-            </p:txBody>
-          </p:sp>
-          <p:sp>
-            <p:nvSpPr>
-              <p:cNvPr id="216" name="Line"/>
-              <p:cNvSpPr/>
-              <p:nvPr/>
-            </p:nvSpPr>
-            <p:spPr>
-              <a:xfrm flipV="1">
-                <a:off x="1140566" y="-1"/>
-                <a:ext cx="1" cy="1971459"/>
-              </a:xfrm>
-              <a:prstGeom prst="line">
-                <a:avLst/>
-              </a:prstGeom>
-              <a:noFill/>
-              <a:ln w="25400" cap="flat">
-                <a:solidFill>
-                  <a:srgbClr val="000000"/>
-                </a:solidFill>
-                <a:prstDash val="solid"/>
-                <a:round/>
-              </a:ln>
-              <a:effectLst/>
-            </p:spPr>
-            <p:txBody>
-              <a:bodyPr wrap="square" lIns="0" tIns="0" rIns="0" bIns="0" numCol="1" anchor="t">
-                <a:noAutofit/>
-              </a:bodyPr>
-              <a:lstStyle/>
-              <a:p>
-                <a:pPr/>
-              </a:p>
-            </p:txBody>
-          </p:sp>
-        </p:grpSp>
         <p:sp>
           <p:nvSpPr>
-            <p:cNvPr id="218" name="Tower A"/>
-            <p:cNvSpPr txBox="1"/>
+            <p:cNvPr id="209" name="Line"/>
+            <p:cNvSpPr/>
+            <p:nvPr/>
+          </p:nvSpPr>
+          <p:spPr>
+            <a:xfrm flipV="1">
+              <a:off x="1140566" y="-1"/>
+              <a:ext cx="1" cy="1971459"/>
+            </a:xfrm>
+            <a:prstGeom prst="line">
+              <a:avLst/>
+            </a:prstGeom>
+            <a:noFill/>
+            <a:ln w="25400" cap="flat">
+              <a:solidFill>
+                <a:srgbClr val="000000"/>
+              </a:solidFill>
+              <a:prstDash val="solid"/>
+              <a:round/>
+            </a:ln>
+            <a:effectLst/>
+          </p:spPr>
+          <p:txBody>
+            <a:bodyPr wrap="square" lIns="0" tIns="0" rIns="0" bIns="0" numCol="1" anchor="t">
+              <a:noAutofit/>
+            </a:bodyPr>
+            <a:lstStyle/>
+            <a:p>
+              <a:pPr/>
+            </a:p>
+          </p:txBody>
+        </p:sp>
+      </p:grpSp>
+      <p:grpSp>
+        <p:nvGrpSpPr>
+          <p:cNvPr id="213" name="Group"/>
+          <p:cNvGrpSpPr/>
+          <p:nvPr/>
+        </p:nvGrpSpPr>
+        <p:grpSpPr>
+          <a:xfrm>
+            <a:off x="3939434" y="4365824"/>
+            <a:ext cx="2281133" cy="1979926"/>
+            <a:chOff x="0" y="0"/>
+            <a:chExt cx="2281132" cy="1979924"/>
+          </a:xfrm>
+        </p:grpSpPr>
+        <p:sp>
+          <p:nvSpPr>
+            <p:cNvPr id="211" name="Line"/>
+            <p:cNvSpPr/>
             <p:nvPr/>
           </p:nvSpPr>
           <p:spPr>
             <a:xfrm>
-              <a:off x="412531" y="1952407"/>
-              <a:ext cx="1456071" cy="546101"/>
+              <a:off x="0" y="1979924"/>
+              <a:ext cx="2281133" cy="1"/>
             </a:xfrm>
-            <a:prstGeom prst="rect">
+            <a:prstGeom prst="line">
               <a:avLst/>
             </a:prstGeom>
             <a:noFill/>
-            <a:ln w="12700" cap="flat">
-              <a:noFill/>
-              <a:miter lim="400000"/>
+            <a:ln w="25400" cap="flat">
+              <a:solidFill>
+                <a:srgbClr val="000000"/>
+              </a:solidFill>
+              <a:prstDash val="solid"/>
+              <a:round/>
             </a:ln>
             <a:effectLst/>
-            <a:extLst>
-              <a:ext uri="{C572A759-6A51-4108-AA02-DFA0A04FC94B}">
-                <ma14:wrappingTextBoxFlag xmlns:ma14="http://schemas.microsoft.com/office/mac/drawingml/2011/main" val="1"/>
-              </a:ext>
-            </a:extLst>
           </p:spPr>
           <p:txBody>
-            <a:bodyPr wrap="none" lIns="50800" tIns="50800" rIns="50800" bIns="50800" numCol="1" anchor="ctr">
-              <a:spAutoFit/>
+            <a:bodyPr wrap="square" lIns="0" tIns="0" rIns="0" bIns="0" numCol="1" anchor="t">
+              <a:noAutofit/>
             </a:bodyPr>
-            <a:lstStyle>
-              <a:lvl1pPr>
-                <a:defRPr sz="3000">
-                  <a:latin typeface="Gill Sans MT"/>
-                  <a:ea typeface="Gill Sans MT"/>
-                  <a:cs typeface="Gill Sans MT"/>
-                  <a:sym typeface="Gill Sans MT"/>
-                </a:defRPr>
-              </a:lvl1pPr>
-            </a:lstStyle>
+            <a:lstStyle/>
             <a:p>
               <a:pPr/>
-              <a:r>
-                <a:t>Tower A</a:t>
-              </a:r>
             </a:p>
           </p:txBody>
         </p:sp>
         <p:sp>
           <p:nvSpPr>
-            <p:cNvPr id="219" name="Tower B"/>
-            <p:cNvSpPr txBox="1"/>
+            <p:cNvPr id="212" name="Line"/>
+            <p:cNvSpPr/>
+            <p:nvPr/>
+          </p:nvSpPr>
+          <p:spPr>
+            <a:xfrm flipV="1">
+              <a:off x="1140566" y="-1"/>
+              <a:ext cx="1" cy="1971459"/>
+            </a:xfrm>
+            <a:prstGeom prst="line">
+              <a:avLst/>
+            </a:prstGeom>
+            <a:noFill/>
+            <a:ln w="25400" cap="flat">
+              <a:solidFill>
+                <a:srgbClr val="000000"/>
+              </a:solidFill>
+              <a:prstDash val="solid"/>
+              <a:round/>
+            </a:ln>
+            <a:effectLst/>
+          </p:spPr>
+          <p:txBody>
+            <a:bodyPr wrap="square" lIns="0" tIns="0" rIns="0" bIns="0" numCol="1" anchor="t">
+              <a:noAutofit/>
+            </a:bodyPr>
+            <a:lstStyle/>
+            <a:p>
+              <a:pPr/>
+            </a:p>
+          </p:txBody>
+        </p:sp>
+      </p:grpSp>
+      <p:grpSp>
+        <p:nvGrpSpPr>
+          <p:cNvPr id="216" name="Group"/>
+          <p:cNvGrpSpPr/>
+          <p:nvPr/>
+        </p:nvGrpSpPr>
+        <p:grpSpPr>
+          <a:xfrm>
+            <a:off x="7055167" y="4365824"/>
+            <a:ext cx="2281133" cy="1979926"/>
+            <a:chOff x="0" y="0"/>
+            <a:chExt cx="2281132" cy="1979924"/>
+          </a:xfrm>
+        </p:grpSpPr>
+        <p:sp>
+          <p:nvSpPr>
+            <p:cNvPr id="214" name="Line"/>
+            <p:cNvSpPr/>
             <p:nvPr/>
           </p:nvSpPr>
           <p:spPr>
             <a:xfrm>
-              <a:off x="3528264" y="1952407"/>
-              <a:ext cx="1454583" cy="546101"/>
+              <a:off x="0" y="1979924"/>
+              <a:ext cx="2281133" cy="1"/>
             </a:xfrm>
-            <a:prstGeom prst="rect">
+            <a:prstGeom prst="line">
               <a:avLst/>
             </a:prstGeom>
             <a:noFill/>
-            <a:ln w="12700" cap="flat">
-              <a:noFill/>
-              <a:miter lim="400000"/>
+            <a:ln w="25400" cap="flat">
+              <a:solidFill>
+                <a:srgbClr val="000000"/>
+              </a:solidFill>
+              <a:prstDash val="solid"/>
+              <a:round/>
             </a:ln>
             <a:effectLst/>
-            <a:extLst>
-              <a:ext uri="{C572A759-6A51-4108-AA02-DFA0A04FC94B}">
-                <ma14:wrappingTextBoxFlag xmlns:ma14="http://schemas.microsoft.com/office/mac/drawingml/2011/main" val="1"/>
-              </a:ext>
-            </a:extLst>
           </p:spPr>
           <p:txBody>
-            <a:bodyPr wrap="none" lIns="50800" tIns="50800" rIns="50800" bIns="50800" numCol="1" anchor="ctr">
-              <a:spAutoFit/>
+            <a:bodyPr wrap="square" lIns="0" tIns="0" rIns="0" bIns="0" numCol="1" anchor="t">
+              <a:noAutofit/>
             </a:bodyPr>
-            <a:lstStyle>
-              <a:lvl1pPr>
-                <a:defRPr sz="3000">
-                  <a:latin typeface="Gill Sans MT"/>
-                  <a:ea typeface="Gill Sans MT"/>
-                  <a:cs typeface="Gill Sans MT"/>
-                  <a:sym typeface="Gill Sans MT"/>
-                </a:defRPr>
-              </a:lvl1pPr>
-            </a:lstStyle>
+            <a:lstStyle/>
             <a:p>
               <a:pPr/>
-              <a:r>
-                <a:t>Tower B</a:t>
-              </a:r>
             </a:p>
           </p:txBody>
         </p:sp>
         <p:sp>
           <p:nvSpPr>
-            <p:cNvPr id="220" name="Tower C"/>
-            <p:cNvSpPr txBox="1"/>
+            <p:cNvPr id="215" name="Line"/>
+            <p:cNvSpPr/>
             <p:nvPr/>
           </p:nvSpPr>
           <p:spPr>
-            <a:xfrm>
-              <a:off x="6639765" y="1901607"/>
-              <a:ext cx="1509835" cy="546101"/>
+            <a:xfrm flipV="1">
+              <a:off x="1140566" y="-1"/>
+              <a:ext cx="1" cy="1971459"/>
             </a:xfrm>
-            <a:prstGeom prst="rect">
+            <a:prstGeom prst="line">
               <a:avLst/>
             </a:prstGeom>
             <a:noFill/>
-            <a:ln w="12700" cap="flat">
-              <a:noFill/>
-              <a:miter lim="400000"/>
+            <a:ln w="25400" cap="flat">
+              <a:solidFill>
+                <a:srgbClr val="000000"/>
+              </a:solidFill>
+              <a:prstDash val="solid"/>
+              <a:round/>
             </a:ln>
             <a:effectLst/>
-            <a:extLst>
-              <a:ext uri="{C572A759-6A51-4108-AA02-DFA0A04FC94B}">
-                <ma14:wrappingTextBoxFlag xmlns:ma14="http://schemas.microsoft.com/office/mac/drawingml/2011/main" val="1"/>
-              </a:ext>
-            </a:extLst>
           </p:spPr>
           <p:txBody>
-            <a:bodyPr wrap="none" lIns="50800" tIns="50800" rIns="50800" bIns="50800" numCol="1" anchor="ctr">
-              <a:spAutoFit/>
+            <a:bodyPr wrap="square" lIns="0" tIns="0" rIns="0" bIns="0" numCol="1" anchor="t">
+              <a:noAutofit/>
             </a:bodyPr>
-            <a:lstStyle>
-              <a:lvl1pPr>
-                <a:defRPr sz="3000">
-                  <a:latin typeface="Gill Sans MT"/>
-                  <a:ea typeface="Gill Sans MT"/>
-                  <a:cs typeface="Gill Sans MT"/>
-                  <a:sym typeface="Gill Sans MT"/>
-                </a:defRPr>
-              </a:lvl1pPr>
-            </a:lstStyle>
+            <a:lstStyle/>
             <a:p>
               <a:pPr/>
-              <a:r>
-                <a:t>Tower C</a:t>
-              </a:r>
             </a:p>
           </p:txBody>
         </p:sp>
+      </p:grpSp>
+      <p:sp>
+        <p:nvSpPr>
+          <p:cNvPr id="217" name="Tower A"/>
+          <p:cNvSpPr txBox="1"/>
+          <p:nvPr/>
+        </p:nvSpPr>
+        <p:spPr>
+          <a:xfrm>
+            <a:off x="1236231" y="6318232"/>
+            <a:ext cx="1456071" cy="546101"/>
+          </a:xfrm>
+          <a:prstGeom prst="rect">
+            <a:avLst/>
+          </a:prstGeom>
+          <a:ln w="12700">
+            <a:miter lim="400000"/>
+          </a:ln>
+          <a:extLst>
+            <a:ext uri="{C572A759-6A51-4108-AA02-DFA0A04FC94B}">
+              <ma14:wrappingTextBoxFlag xmlns:ma14="http://schemas.microsoft.com/office/mac/drawingml/2011/main" val="1"/>
+            </a:ext>
+          </a:extLst>
+        </p:spPr>
+        <p:txBody>
+          <a:bodyPr wrap="none" lIns="50800" tIns="50800" rIns="50800" bIns="50800" anchor="ctr">
+            <a:spAutoFit/>
+          </a:bodyPr>
+          <a:lstStyle>
+            <a:lvl1pPr>
+              <a:defRPr sz="3000">
+                <a:latin typeface="Gill Sans MT"/>
+                <a:ea typeface="Gill Sans MT"/>
+                <a:cs typeface="Gill Sans MT"/>
+                <a:sym typeface="Gill Sans MT"/>
+              </a:defRPr>
+            </a:lvl1pPr>
+          </a:lstStyle>
+          <a:p>
+            <a:pPr/>
+            <a:r>
+              <a:t>Tower A</a:t>
+            </a:r>
+          </a:p>
+        </p:txBody>
+      </p:sp>
+      <p:sp>
+        <p:nvSpPr>
+          <p:cNvPr id="218" name="Tower B"/>
+          <p:cNvSpPr txBox="1"/>
+          <p:nvPr/>
+        </p:nvSpPr>
+        <p:spPr>
+          <a:xfrm>
+            <a:off x="4351965" y="6318232"/>
+            <a:ext cx="1454582" cy="546101"/>
+          </a:xfrm>
+          <a:prstGeom prst="rect">
+            <a:avLst/>
+          </a:prstGeom>
+          <a:ln w="12700">
+            <a:miter lim="400000"/>
+          </a:ln>
+          <a:extLst>
+            <a:ext uri="{C572A759-6A51-4108-AA02-DFA0A04FC94B}">
+              <ma14:wrappingTextBoxFlag xmlns:ma14="http://schemas.microsoft.com/office/mac/drawingml/2011/main" val="1"/>
+            </a:ext>
+          </a:extLst>
+        </p:spPr>
+        <p:txBody>
+          <a:bodyPr wrap="none" lIns="50800" tIns="50800" rIns="50800" bIns="50800" anchor="ctr">
+            <a:spAutoFit/>
+          </a:bodyPr>
+          <a:lstStyle>
+            <a:lvl1pPr>
+              <a:defRPr sz="3000">
+                <a:latin typeface="Gill Sans MT"/>
+                <a:ea typeface="Gill Sans MT"/>
+                <a:cs typeface="Gill Sans MT"/>
+                <a:sym typeface="Gill Sans MT"/>
+              </a:defRPr>
+            </a:lvl1pPr>
+          </a:lstStyle>
+          <a:p>
+            <a:pPr/>
+            <a:r>
+              <a:t>Tower B</a:t>
+            </a:r>
+          </a:p>
+        </p:txBody>
+      </p:sp>
+      <p:sp>
+        <p:nvSpPr>
+          <p:cNvPr id="219" name="Tower C"/>
+          <p:cNvSpPr txBox="1"/>
+          <p:nvPr/>
+        </p:nvSpPr>
+        <p:spPr>
+          <a:xfrm>
+            <a:off x="7463465" y="6267432"/>
+            <a:ext cx="1509835" cy="546101"/>
+          </a:xfrm>
+          <a:prstGeom prst="rect">
+            <a:avLst/>
+          </a:prstGeom>
+          <a:ln w="12700">
+            <a:miter lim="400000"/>
+          </a:ln>
+          <a:extLst>
+            <a:ext uri="{C572A759-6A51-4108-AA02-DFA0A04FC94B}">
+              <ma14:wrappingTextBoxFlag xmlns:ma14="http://schemas.microsoft.com/office/mac/drawingml/2011/main" val="1"/>
+            </a:ext>
+          </a:extLst>
+        </p:spPr>
+        <p:txBody>
+          <a:bodyPr wrap="none" lIns="50800" tIns="50800" rIns="50800" bIns="50800" anchor="ctr">
+            <a:spAutoFit/>
+          </a:bodyPr>
+          <a:lstStyle>
+            <a:lvl1pPr>
+              <a:defRPr sz="3000">
+                <a:latin typeface="Gill Sans MT"/>
+                <a:ea typeface="Gill Sans MT"/>
+                <a:cs typeface="Gill Sans MT"/>
+                <a:sym typeface="Gill Sans MT"/>
+              </a:defRPr>
+            </a:lvl1pPr>
+          </a:lstStyle>
+          <a:p>
+            <a:pPr/>
+            <a:r>
+              <a:t>Tower C</a:t>
+            </a:r>
+          </a:p>
+        </p:txBody>
+      </p:sp>
+      <p:grpSp>
+        <p:nvGrpSpPr>
+          <p:cNvPr id="223" name="Group"/>
+          <p:cNvGrpSpPr/>
+          <p:nvPr/>
+        </p:nvGrpSpPr>
+        <p:grpSpPr>
+          <a:xfrm>
+            <a:off x="7619369" y="4907686"/>
+            <a:ext cx="1152728" cy="1414786"/>
+            <a:chOff x="0" y="0"/>
+            <a:chExt cx="1152726" cy="1414784"/>
+          </a:xfrm>
+        </p:grpSpPr>
         <p:sp>
           <p:nvSpPr>
-            <p:cNvPr id="221" name="Rectangle"/>
+            <p:cNvPr id="220" name="Rectangle"/>
             <p:cNvSpPr/>
             <p:nvPr/>
           </p:nvSpPr>
           <p:spPr>
             <a:xfrm>
-              <a:off x="3685657" y="1273872"/>
-              <a:ext cx="1152727" cy="373386"/>
+              <a:off x="0" y="1041400"/>
+              <a:ext cx="1152727" cy="373385"/>
             </a:xfrm>
             <a:prstGeom prst="rect">
               <a:avLst/>
@@ -11309,14 +11491,14 @@
         </p:sp>
         <p:sp>
           <p:nvSpPr>
-            <p:cNvPr id="222" name="Rectangle"/>
+            <p:cNvPr id="221" name="Rectangle"/>
             <p:cNvSpPr/>
             <p:nvPr/>
           </p:nvSpPr>
           <p:spPr>
             <a:xfrm>
-              <a:off x="4067053" y="232472"/>
-              <a:ext cx="391191" cy="373386"/>
+              <a:off x="381396" y="0"/>
+              <a:ext cx="391190" cy="373385"/>
             </a:xfrm>
             <a:prstGeom prst="rect">
               <a:avLst/>
@@ -11348,14 +11530,14 @@
         </p:sp>
         <p:sp>
           <p:nvSpPr>
-            <p:cNvPr id="223" name="Line"/>
+            <p:cNvPr id="222" name="Line"/>
             <p:cNvSpPr/>
             <p:nvPr/>
           </p:nvSpPr>
           <p:spPr>
             <a:xfrm flipV="1">
-              <a:off x="4458638" y="707517"/>
-              <a:ext cx="1" cy="431553"/>
+              <a:off x="772981" y="475045"/>
+              <a:ext cx="1" cy="431552"/>
             </a:xfrm>
             <a:prstGeom prst="line">
               <a:avLst/>
@@ -11422,7 +11604,7 @@
                                       <p:cBhvr>
                                         <p:cTn id="6" fill="hold"/>
                                         <p:tgtEl>
-                                          <p:spTgt spid="206"/>
+                                          <p:spTgt spid="186"/>
                                         </p:tgtEl>
                                         <p:attrNameLst>
                                           <p:attrName>style.visibility</p:attrName>
@@ -11454,28 +11636,23 @@
                             </p:stCondLst>
                             <p:childTnLst>
                               <p:par>
-                                <p:cTn id="9" presetClass="entr" nodeType="clickEffect" presetSubtype="0" presetID="1" grpId="2" fill="hold">
+                                <p:cTn id="9" presetClass="path" nodeType="clickEffect" presetSubtype="0" presetID="-1" grpId="2" accel="50000" decel="50000" fill="hold">
                                   <p:stCondLst>
                                     <p:cond delay="0"/>
                                   </p:stCondLst>
-                                  <p:iterate type="el" backwards="0">
-                                    <p:tmAbs val="0"/>
-                                  </p:iterate>
                                   <p:childTnLst>
-                                    <p:set>
+                                    <p:animMotion path="M 0.000000 0.000000 L 0.306667 0.000000" origin="layout" pathEditMode="relative">
                                       <p:cBhvr>
-                                        <p:cTn id="10" fill="hold"/>
+                                        <p:cTn id="10" dur="1000" fill="hold"/>
                                         <p:tgtEl>
-                                          <p:spTgt spid="207"/>
+                                          <p:spTgt spid="190"/>
                                         </p:tgtEl>
                                         <p:attrNameLst>
-                                          <p:attrName>style.visibility</p:attrName>
+                                          <p:attrName>ppt_x</p:attrName>
+                                          <p:attrName>ppt_y</p:attrName>
                                         </p:attrNameLst>
                                       </p:cBhvr>
-                                      <p:to>
-                                        <p:strVal val="visible"/>
-                                      </p:to>
-                                    </p:set>
+                                    </p:animMotion>
                                   </p:childTnLst>
                                 </p:cTn>
                               </p:par>
@@ -11510,7 +11687,7 @@
                                       <p:cBhvr>
                                         <p:cTn id="14" fill="hold"/>
                                         <p:tgtEl>
-                                          <p:spTgt spid="224"/>
+                                          <p:spTgt spid="206"/>
                                         </p:tgtEl>
                                         <p:attrNameLst>
                                           <p:attrName>style.visibility</p:attrName>
@@ -11520,6 +11697,45 @@
                                         <p:strVal val="visible"/>
                                       </p:to>
                                     </p:set>
+                                  </p:childTnLst>
+                                </p:cTn>
+                              </p:par>
+                            </p:childTnLst>
+                          </p:cTn>
+                        </p:par>
+                      </p:childTnLst>
+                    </p:cTn>
+                  </p:par>
+                  <p:par>
+                    <p:cTn id="15" fill="hold">
+                      <p:stCondLst>
+                        <p:cond delay="indefinite"/>
+                      </p:stCondLst>
+                      <p:childTnLst>
+                        <p:par>
+                          <p:cTn id="16" fill="hold">
+                            <p:stCondLst>
+                              <p:cond delay="0"/>
+                            </p:stCondLst>
+                            <p:childTnLst>
+                              <p:par>
+                                <p:cTn id="17" presetClass="path" nodeType="clickEffect" presetSubtype="0" presetID="-1" grpId="4" accel="50000" decel="50000" fill="hold">
+                                  <p:stCondLst>
+                                    <p:cond delay="0"/>
+                                  </p:stCondLst>
+                                  <p:childTnLst>
+                                    <p:animMotion path="M 0.000000 0.000000 L -0.306667 -0.041227" origin="layout" pathEditMode="relative">
+                                      <p:cBhvr>
+                                        <p:cTn id="18" dur="1000" fill="hold"/>
+                                        <p:tgtEl>
+                                          <p:spTgt spid="223"/>
+                                        </p:tgtEl>
+                                        <p:attrNameLst>
+                                          <p:attrName>ppt_x</p:attrName>
+                                          <p:attrName>ppt_y</p:attrName>
+                                        </p:attrNameLst>
+                                      </p:cBhvr>
+                                    </p:animMotion>
                                   </p:childTnLst>
                                 </p:cTn>
                               </p:par>
@@ -11551,9 +11767,8 @@
       </p:par>
     </p:tnLst>
     <p:bldLst>
-      <p:bldP build="whole" bldLvl="1" animBg="1" rev="0" advAuto="0" spid="224" grpId="3"/>
-      <p:bldP build="whole" bldLvl="1" animBg="1" rev="0" advAuto="0" spid="207" grpId="2"/>
-      <p:bldP build="whole" bldLvl="1" animBg="1" rev="0" advAuto="0" spid="206" grpId="1"/>
+      <p:bldP build="whole" bldLvl="1" animBg="1" rev="0" advAuto="0" spid="186" grpId="1"/>
+      <p:bldP build="whole" bldLvl="1" animBg="1" rev="0" advAuto="0" spid="206" grpId="3"/>
     </p:bldLst>
   </p:timing>
 </p:sld>
@@ -11797,7 +12012,7 @@
       </p:grpSpPr>
       <p:sp>
         <p:nvSpPr>
-          <p:cNvPr id="226" name="Permutation of N number"/>
+          <p:cNvPr id="225" name="Permutation of N number"/>
           <p:cNvSpPr txBox="1"/>
           <p:nvPr>
             <p:ph type="title"/>
@@ -11821,7 +12036,7 @@
       </p:sp>
       <p:sp>
         <p:nvSpPr>
-          <p:cNvPr id="227" name="Tasks: Given N items, print all of its permutations…"/>
+          <p:cNvPr id="226" name="Tasks: Given N items, print all of its permutations…"/>
           <p:cNvSpPr txBox="1"/>
           <p:nvPr>
             <p:ph type="body" idx="1"/>
@@ -11953,7 +12168,7 @@
       </p:sp>
       <p:sp>
         <p:nvSpPr>
-          <p:cNvPr id="228" name="Slide Number"/>
+          <p:cNvPr id="227" name="Slide Number"/>
           <p:cNvSpPr txBox="1"/>
           <p:nvPr>
             <p:ph type="sldNum" sz="quarter" idx="2"/>
@@ -11980,7 +12195,7 @@
       </p:sp>
       <p:sp>
         <p:nvSpPr>
-          <p:cNvPr id="229" name="DAA/Algorithm Specifications"/>
+          <p:cNvPr id="228" name="DAA/Algorithm Specifications"/>
           <p:cNvSpPr txBox="1"/>
           <p:nvPr/>
         </p:nvSpPr>
@@ -12020,7 +12235,7 @@
       </p:sp>
       <p:sp>
         <p:nvSpPr>
-          <p:cNvPr id="230" name="RPR/"/>
+          <p:cNvPr id="229" name="RPR/"/>
           <p:cNvSpPr txBox="1"/>
           <p:nvPr/>
         </p:nvSpPr>
@@ -12097,7 +12312,7 @@
                                       <p:cBhvr>
                                         <p:cTn id="6" fill="hold"/>
                                         <p:tgtEl>
-                                          <p:spTgt spid="227">
+                                          <p:spTgt spid="226">
                                             <p:bg/>
                                           </p:spTgt>
                                         </p:tgtEl>
@@ -12125,7 +12340,7 @@
                                       <p:cBhvr>
                                         <p:cTn id="8" fill="hold"/>
                                         <p:tgtEl>
-                                          <p:spTgt spid="227">
+                                          <p:spTgt spid="226">
                                             <p:txEl>
                                               <p:pRg st="0" end="0"/>
                                             </p:txEl>
@@ -12173,7 +12388,7 @@
                                       <p:cBhvr>
                                         <p:cTn id="12" fill="hold"/>
                                         <p:tgtEl>
-                                          <p:spTgt spid="227">
+                                          <p:spTgt spid="226">
                                             <p:txEl>
                                               <p:pRg st="1" end="1"/>
                                             </p:txEl>
@@ -12221,7 +12436,7 @@
                                       <p:cBhvr>
                                         <p:cTn id="16" fill="hold"/>
                                         <p:tgtEl>
-                                          <p:spTgt spid="227">
+                                          <p:spTgt spid="226">
                                             <p:txEl>
                                               <p:pRg st="2" end="2"/>
                                             </p:txEl>
@@ -12269,7 +12484,7 @@
                                       <p:cBhvr>
                                         <p:cTn id="20" fill="hold"/>
                                         <p:tgtEl>
-                                          <p:spTgt spid="227">
+                                          <p:spTgt spid="226">
                                             <p:txEl>
                                               <p:pRg st="3" end="3"/>
                                             </p:txEl>
@@ -12317,7 +12532,7 @@
                                       <p:cBhvr>
                                         <p:cTn id="24" fill="hold"/>
                                         <p:tgtEl>
-                                          <p:spTgt spid="227">
+                                          <p:spTgt spid="226">
                                             <p:txEl>
                                               <p:pRg st="4" end="4"/>
                                             </p:txEl>
@@ -12365,7 +12580,7 @@
                                       <p:cBhvr>
                                         <p:cTn id="28" fill="hold"/>
                                         <p:tgtEl>
-                                          <p:spTgt spid="227">
+                                          <p:spTgt spid="226">
                                             <p:txEl>
                                               <p:pRg st="5" end="5"/>
                                             </p:txEl>
@@ -12413,7 +12628,7 @@
                                       <p:cBhvr>
                                         <p:cTn id="32" fill="hold"/>
                                         <p:tgtEl>
-                                          <p:spTgt spid="227">
+                                          <p:spTgt spid="226">
                                             <p:txEl>
                                               <p:pRg st="6" end="6"/>
                                             </p:txEl>
@@ -12461,7 +12676,7 @@
                                       <p:cBhvr>
                                         <p:cTn id="36" fill="hold"/>
                                         <p:tgtEl>
-                                          <p:spTgt spid="227">
+                                          <p:spTgt spid="226">
                                             <p:txEl>
                                               <p:pRg st="7" end="7"/>
                                             </p:txEl>
@@ -12506,7 +12721,7 @@
       </p:par>
     </p:tnLst>
     <p:bldLst>
-      <p:bldP build="p" bldLvl="5" animBg="1" rev="0" advAuto="0" spid="227" grpId="1"/>
+      <p:bldP build="p" bldLvl="5" animBg="1" rev="0" advAuto="0" spid="226" grpId="1"/>
     </p:bldLst>
   </p:timing>
 </p:sld>
@@ -12531,7 +12746,7 @@
       </p:grpSpPr>
       <p:sp>
         <p:nvSpPr>
-          <p:cNvPr id="232" name="Exercises Using Recursion"/>
+          <p:cNvPr id="231" name="Exercises Using Recursion"/>
           <p:cNvSpPr txBox="1"/>
           <p:nvPr>
             <p:ph type="title"/>
@@ -12555,7 +12770,7 @@
       </p:sp>
       <p:sp>
         <p:nvSpPr>
-          <p:cNvPr id="233" name="Generate n sequences for Fibonacci series, given…"/>
+          <p:cNvPr id="232" name="Generate n sequences for Fibonacci series, given…"/>
           <p:cNvSpPr txBox="1"/>
           <p:nvPr>
             <p:ph type="body" idx="1"/>
@@ -12605,88 +12820,6 @@
             </a:r>
           </a:p>
           <a:p>
-            <a:pPr/>
-            <a:r>
-              <a:t>Specify Horner’s rule in recursive way</a:t>
-            </a:r>
-          </a:p>
-          <a:p>
-            <a:pPr lvl="1">
-              <a:defRPr>
-                <a:latin typeface="Courier New"/>
-                <a:ea typeface="Courier New"/>
-                <a:cs typeface="Courier New"/>
-                <a:sym typeface="Courier New"/>
-              </a:defRPr>
-            </a:pPr>
-            <a:r>
-              <a:t>A(x) = a</a:t>
-            </a:r>
-            <a:r>
-              <a:rPr baseline="-5999"/>
-              <a:t>n</a:t>
-            </a:r>
-            <a:r>
-              <a:t>x</a:t>
-            </a:r>
-            <a:r>
-              <a:rPr baseline="31999"/>
-              <a:t>n</a:t>
-            </a:r>
-            <a:r>
-              <a:rPr baseline="-5999"/>
-              <a:t> </a:t>
-            </a:r>
-            <a:r>
-              <a:t>+ a</a:t>
-            </a:r>
-            <a:r>
-              <a:rPr baseline="-5999"/>
-              <a:t>n-1</a:t>
-            </a:r>
-            <a:r>
-              <a:t>x</a:t>
-            </a:r>
-            <a:r>
-              <a:rPr baseline="31999"/>
-              <a:t>n-1</a:t>
-            </a:r>
-            <a:r>
-              <a:rPr baseline="-5999"/>
-              <a:t> </a:t>
-            </a:r>
-            <a:r>
-              <a:t>+ … + a</a:t>
-            </a:r>
-            <a:r>
-              <a:rPr baseline="-5999"/>
-              <a:t>1</a:t>
-            </a:r>
-            <a:r>
-              <a:rPr baseline="31999"/>
-              <a:t>x</a:t>
-            </a:r>
-            <a:r>
-              <a:t> + a</a:t>
-            </a:r>
-            <a:r>
-              <a:rPr baseline="-5999"/>
-              <a:t>0</a:t>
-            </a:r>
-          </a:p>
-          <a:p>
-            <a:pPr/>
-            <a:r>
-              <a:t>Given N boolean variables, print all possible combinations of possible truth values </a:t>
-            </a:r>
-          </a:p>
-          <a:p>
-            <a:pPr lvl="1"/>
-            <a:r>
-              <a:t>e.g. for 3 boolean variables, the possible values are</a:t>
-            </a:r>
-          </a:p>
-          <a:p>
             <a:pPr lvl="3" marL="0" indent="685800">
               <a:buSzTx/>
               <a:buNone/>
@@ -12698,6 +12831,103 @@
               </a:defRPr>
             </a:pPr>
             <a:r>
+              <a:t>F(n) = F(n-1) + F(n-2)</a:t>
+            </a:r>
+          </a:p>
+          <a:p>
+            <a:pPr/>
+            <a:r>
+              <a:t>Specify Horner’s rule in recursive way</a:t>
+            </a:r>
+          </a:p>
+          <a:p>
+            <a:pPr lvl="1">
+              <a:defRPr>
+                <a:latin typeface="Courier New"/>
+                <a:ea typeface="Courier New"/>
+                <a:cs typeface="Courier New"/>
+                <a:sym typeface="Courier New"/>
+              </a:defRPr>
+            </a:pPr>
+            <a:r>
+              <a:t>A(x) = a</a:t>
+            </a:r>
+            <a:r>
+              <a:rPr baseline="-5999"/>
+              <a:t>n</a:t>
+            </a:r>
+            <a:r>
+              <a:t>x</a:t>
+            </a:r>
+            <a:r>
+              <a:rPr baseline="31999"/>
+              <a:t>n</a:t>
+            </a:r>
+            <a:r>
+              <a:rPr baseline="-5999"/>
+              <a:t> </a:t>
+            </a:r>
+            <a:r>
+              <a:t>+ a</a:t>
+            </a:r>
+            <a:r>
+              <a:rPr baseline="-5999"/>
+              <a:t>n-1</a:t>
+            </a:r>
+            <a:r>
+              <a:t>x</a:t>
+            </a:r>
+            <a:r>
+              <a:rPr baseline="31999"/>
+              <a:t>n-1</a:t>
+            </a:r>
+            <a:r>
+              <a:rPr baseline="-5999"/>
+              <a:t> </a:t>
+            </a:r>
+            <a:r>
+              <a:t>+ … + a</a:t>
+            </a:r>
+            <a:r>
+              <a:rPr baseline="-5999"/>
+              <a:t>1</a:t>
+            </a:r>
+            <a:r>
+              <a:rPr baseline="31999"/>
+              <a:t>x</a:t>
+            </a:r>
+            <a:r>
+              <a:t> + a</a:t>
+            </a:r>
+            <a:r>
+              <a:rPr baseline="-5999"/>
+              <a:t>0</a:t>
+            </a:r>
+          </a:p>
+          <a:p>
+            <a:pPr/>
+            <a:r>
+              <a:t>Given N boolean variables, print all possible combinations of possible truth values </a:t>
+            </a:r>
+          </a:p>
+          <a:p>
+            <a:pPr lvl="1"/>
+            <a:r>
+              <a:t>e.g. for 3 boolean variables, the possible values are</a:t>
+            </a:r>
+          </a:p>
+          <a:p>
+            <a:pPr lvl="3" marL="0" indent="685800">
+              <a:buSzTx/>
+              <a:buNone/>
+              <a:defRPr>
+                <a:latin typeface="Courier New"/>
+                <a:ea typeface="Courier New"/>
+                <a:cs typeface="Courier New"/>
+                <a:sym typeface="Courier New"/>
+              </a:defRPr>
+            </a:pPr>
+            <a:r>
               <a:t>TTT, TTF, TFT, TFF, FTT, FTF, FFT, FFF</a:t>
             </a:r>
           </a:p>
@@ -12743,7 +12973,7 @@
       </p:sp>
       <p:sp>
         <p:nvSpPr>
-          <p:cNvPr id="234" name="Slide Number"/>
+          <p:cNvPr id="233" name="Slide Number"/>
           <p:cNvSpPr txBox="1"/>
           <p:nvPr>
             <p:ph type="sldNum" sz="quarter" idx="2"/>
@@ -12770,7 +13000,7 @@
       </p:sp>
       <p:sp>
         <p:nvSpPr>
-          <p:cNvPr id="235" name="DAA/Algorithm Specifications"/>
+          <p:cNvPr id="234" name="DAA/Algorithm Specifications"/>
           <p:cNvSpPr txBox="1"/>
           <p:nvPr/>
         </p:nvSpPr>
@@ -12810,7 +13040,7 @@
       </p:sp>
       <p:sp>
         <p:nvSpPr>
-          <p:cNvPr id="236" name="RPR/"/>
+          <p:cNvPr id="235" name="RPR/"/>
           <p:cNvSpPr txBox="1"/>
           <p:nvPr/>
         </p:nvSpPr>
@@ -12887,7 +13117,7 @@
                                       <p:cBhvr>
                                         <p:cTn id="6" fill="hold"/>
                                         <p:tgtEl>
-                                          <p:spTgt spid="233">
+                                          <p:spTgt spid="232">
                                             <p:bg/>
                                           </p:spTgt>
                                         </p:tgtEl>
@@ -12915,7 +13145,7 @@
                                       <p:cBhvr>
                                         <p:cTn id="8" fill="hold"/>
                                         <p:tgtEl>
-                                          <p:spTgt spid="233">
+                                          <p:spTgt spid="232">
                                             <p:txEl>
                                               <p:pRg st="0" end="0"/>
                                             </p:txEl>
@@ -12963,7 +13193,7 @@
                                       <p:cBhvr>
                                         <p:cTn id="12" fill="hold"/>
                                         <p:tgtEl>
-                                          <p:spTgt spid="233">
+                                          <p:spTgt spid="232">
                                             <p:txEl>
                                               <p:pRg st="1" end="1"/>
                                             </p:txEl>
@@ -13011,7 +13241,7 @@
                                       <p:cBhvr>
                                         <p:cTn id="16" fill="hold"/>
                                         <p:tgtEl>
-                                          <p:spTgt spid="233">
+                                          <p:spTgt spid="232">
                                             <p:txEl>
                                               <p:pRg st="2" end="2"/>
                                             </p:txEl>
@@ -13059,7 +13289,7 @@
                                       <p:cBhvr>
                                         <p:cTn id="20" fill="hold"/>
                                         <p:tgtEl>
-                                          <p:spTgt spid="233">
+                                          <p:spTgt spid="232">
                                             <p:txEl>
                                               <p:pRg st="3" end="3"/>
                                             </p:txEl>
@@ -13107,7 +13337,7 @@
                                       <p:cBhvr>
                                         <p:cTn id="24" fill="hold"/>
                                         <p:tgtEl>
-                                          <p:spTgt spid="233">
+                                          <p:spTgt spid="232">
                                             <p:txEl>
                                               <p:pRg st="4" end="4"/>
                                             </p:txEl>
@@ -13155,7 +13385,7 @@
                                       <p:cBhvr>
                                         <p:cTn id="28" fill="hold"/>
                                         <p:tgtEl>
-                                          <p:spTgt spid="233">
+                                          <p:spTgt spid="232">
                                             <p:txEl>
                                               <p:pRg st="5" end="5"/>
                                             </p:txEl>
@@ -13203,7 +13433,7 @@
                                       <p:cBhvr>
                                         <p:cTn id="32" fill="hold"/>
                                         <p:tgtEl>
-                                          <p:spTgt spid="233">
+                                          <p:spTgt spid="232">
                                             <p:txEl>
                                               <p:pRg st="6" end="6"/>
                                             </p:txEl>
@@ -13251,7 +13481,7 @@
                                       <p:cBhvr>
                                         <p:cTn id="36" fill="hold"/>
                                         <p:tgtEl>
-                                          <p:spTgt spid="233">
+                                          <p:spTgt spid="232">
                                             <p:txEl>
                                               <p:pRg st="7" end="7"/>
                                             </p:txEl>
@@ -13299,7 +13529,7 @@
                                       <p:cBhvr>
                                         <p:cTn id="40" fill="hold"/>
                                         <p:tgtEl>
-                                          <p:spTgt spid="233">
+                                          <p:spTgt spid="232">
                                             <p:txEl>
                                               <p:pRg st="8" end="8"/>
                                             </p:txEl>
@@ -13347,9 +13577,57 @@
                                       <p:cBhvr>
                                         <p:cTn id="44" fill="hold"/>
                                         <p:tgtEl>
-                                          <p:spTgt spid="233">
+                                          <p:spTgt spid="232">
                                             <p:txEl>
                                               <p:pRg st="9" end="9"/>
+                                            </p:txEl>
+                                          </p:spTgt>
+                                        </p:tgtEl>
+                                        <p:attrNameLst>
+                                          <p:attrName>style.visibility</p:attrName>
+                                        </p:attrNameLst>
+                                      </p:cBhvr>
+                                      <p:to>
+                                        <p:strVal val="visible"/>
+                                      </p:to>
+                                    </p:set>
+                                  </p:childTnLst>
+                                </p:cTn>
+                              </p:par>
+                            </p:childTnLst>
+                          </p:cTn>
+                        </p:par>
+                      </p:childTnLst>
+                    </p:cTn>
+                  </p:par>
+                  <p:par>
+                    <p:cTn id="45" fill="hold">
+                      <p:stCondLst>
+                        <p:cond delay="indefinite"/>
+                      </p:stCondLst>
+                      <p:childTnLst>
+                        <p:par>
+                          <p:cTn id="46" fill="hold">
+                            <p:stCondLst>
+                              <p:cond delay="0"/>
+                            </p:stCondLst>
+                            <p:childTnLst>
+                              <p:par>
+                                <p:cTn id="47" presetClass="entr" nodeType="clickEffect" presetSubtype="0" presetID="1" grpId="1" fill="hold">
+                                  <p:stCondLst>
+                                    <p:cond delay="0"/>
+                                  </p:stCondLst>
+                                  <p:iterate type="el" backwards="0">
+                                    <p:tmAbs val="0"/>
+                                  </p:iterate>
+                                  <p:childTnLst>
+                                    <p:set>
+                                      <p:cBhvr>
+                                        <p:cTn id="48" fill="hold"/>
+                                        <p:tgtEl>
+                                          <p:spTgt spid="232">
+                                            <p:txEl>
+                                              <p:pRg st="10" end="10"/>
                                             </p:txEl>
                                           </p:spTgt>
                                         </p:tgtEl>
@@ -13392,7 +13670,7 @@
       </p:par>
     </p:tnLst>
     <p:bldLst>
-      <p:bldP build="p" bldLvl="5" animBg="1" rev="0" advAuto="0" spid="233" grpId="1"/>
+      <p:bldP build="p" bldLvl="5" animBg="1" rev="0" advAuto="0" spid="232" grpId="1"/>
     </p:bldLst>
   </p:timing>
 </p:sld>
@@ -13417,7 +13695,7 @@
       </p:grpSpPr>
       <p:sp>
         <p:nvSpPr>
-          <p:cNvPr id="238" name="Summary"/>
+          <p:cNvPr id="237" name="Summary"/>
           <p:cNvSpPr txBox="1"/>
           <p:nvPr>
             <p:ph type="title"/>
@@ -13441,7 +13719,7 @@
       </p:sp>
       <p:sp>
         <p:nvSpPr>
-          <p:cNvPr id="239" name="Algorithm critiera…"/>
+          <p:cNvPr id="238" name="Algorithm critiera…"/>
           <p:cNvSpPr txBox="1"/>
           <p:nvPr>
             <p:ph type="body" idx="1"/>
@@ -13519,7 +13797,7 @@
       </p:sp>
       <p:sp>
         <p:nvSpPr>
-          <p:cNvPr id="240" name="Slide Number"/>
+          <p:cNvPr id="239" name="Slide Number"/>
           <p:cNvSpPr txBox="1"/>
           <p:nvPr>
             <p:ph type="sldNum" sz="quarter" idx="2"/>
@@ -13546,7 +13824,7 @@
       </p:sp>
       <p:sp>
         <p:nvSpPr>
-          <p:cNvPr id="241" name="DAA/Algorithm Specifications"/>
+          <p:cNvPr id="240" name="DAA/Algorithm Specifications"/>
           <p:cNvSpPr txBox="1"/>
           <p:nvPr/>
         </p:nvSpPr>
@@ -13586,7 +13864,7 @@
       </p:sp>
       <p:sp>
         <p:nvSpPr>
-          <p:cNvPr id="242" name="RPR/"/>
+          <p:cNvPr id="241" name="RPR/"/>
           <p:cNvSpPr txBox="1"/>
           <p:nvPr/>
         </p:nvSpPr>
@@ -13663,7 +13941,7 @@
                                       <p:cBhvr>
                                         <p:cTn id="6" fill="hold"/>
                                         <p:tgtEl>
-                                          <p:spTgt spid="239">
+                                          <p:spTgt spid="238">
                                             <p:bg/>
                                           </p:spTgt>
                                         </p:tgtEl>
@@ -13691,7 +13969,7 @@
                                       <p:cBhvr>
                                         <p:cTn id="8" fill="hold"/>
                                         <p:tgtEl>
-                                          <p:spTgt spid="239">
+                                          <p:spTgt spid="238">
                                             <p:txEl>
                                               <p:pRg st="0" end="0"/>
                                             </p:txEl>
@@ -13739,7 +14017,7 @@
                                       <p:cBhvr>
                                         <p:cTn id="12" fill="hold"/>
                                         <p:tgtEl>
-                                          <p:spTgt spid="239">
+                                          <p:spTgt spid="238">
                                             <p:txEl>
                                               <p:pRg st="1" end="1"/>
                                             </p:txEl>
@@ -13787,7 +14065,7 @@
                                       <p:cBhvr>
                                         <p:cTn id="16" fill="hold"/>
                                         <p:tgtEl>
-                                          <p:spTgt spid="239">
+                                          <p:spTgt spid="238">
                                             <p:txEl>
                                               <p:pRg st="2" end="2"/>
                                             </p:txEl>
@@ -13835,7 +14113,7 @@
                                       <p:cBhvr>
                                         <p:cTn id="20" fill="hold"/>
                                         <p:tgtEl>
-                                          <p:spTgt spid="239">
+                                          <p:spTgt spid="238">
                                             <p:txEl>
                                               <p:pRg st="3" end="3"/>
                                             </p:txEl>
@@ -13883,7 +14161,7 @@
                                       <p:cBhvr>
                                         <p:cTn id="24" fill="hold"/>
                                         <p:tgtEl>
-                                          <p:spTgt spid="239">
+                                          <p:spTgt spid="238">
                                             <p:txEl>
                                               <p:pRg st="4" end="4"/>
                                             </p:txEl>
@@ -13931,7 +14209,7 @@
                                       <p:cBhvr>
                                         <p:cTn id="28" fill="hold"/>
                                         <p:tgtEl>
-                                          <p:spTgt spid="239">
+                                          <p:spTgt spid="238">
                                             <p:txEl>
                                               <p:pRg st="5" end="5"/>
                                             </p:txEl>
@@ -13979,7 +14257,7 @@
                                       <p:cBhvr>
                                         <p:cTn id="32" fill="hold"/>
                                         <p:tgtEl>
-                                          <p:spTgt spid="239">
+                                          <p:spTgt spid="238">
                                             <p:txEl>
                                               <p:pRg st="6" end="6"/>
                                             </p:txEl>
@@ -14027,7 +14305,7 @@
                                       <p:cBhvr>
                                         <p:cTn id="36" fill="hold"/>
                                         <p:tgtEl>
-                                          <p:spTgt spid="239">
+                                          <p:spTgt spid="238">
                                             <p:txEl>
                                               <p:pRg st="7" end="7"/>
                                             </p:txEl>
@@ -14075,7 +14353,7 @@
                                       <p:cBhvr>
                                         <p:cTn id="40" fill="hold"/>
                                         <p:tgtEl>
-                                          <p:spTgt spid="239">
+                                          <p:spTgt spid="238">
                                             <p:txEl>
                                               <p:pRg st="8" end="8"/>
                                             </p:txEl>
@@ -14123,7 +14401,7 @@
                                       <p:cBhvr>
                                         <p:cTn id="44" fill="hold"/>
                                         <p:tgtEl>
-                                          <p:spTgt spid="239">
+                                          <p:spTgt spid="238">
                                             <p:txEl>
                                               <p:pRg st="9" end="9"/>
                                             </p:txEl>
@@ -14168,7 +14446,7 @@
       </p:par>
     </p:tnLst>
     <p:bldLst>
-      <p:bldP build="p" bldLvl="5" animBg="1" rev="0" advAuto="0" spid="239" grpId="1"/>
+      <p:bldP build="p" bldLvl="5" animBg="1" rev="0" advAuto="0" spid="238" grpId="1"/>
     </p:bldLst>
   </p:timing>
 </p:sld>
@@ -14240,6 +14518,30 @@
           <a:p>
             <a:pPr lvl="1"/>
             <a:r>
+              <a:t>Analysis of programs </a:t>
+            </a:r>
+          </a:p>
+          <a:p>
+            <a:pPr lvl="2"/>
+            <a:r>
+              <a:t>Count number of digits</a:t>
+            </a:r>
+          </a:p>
+          <a:p>
+            <a:pPr lvl="2"/>
+            <a:r>
+              <a:t>Reverse the digits</a:t>
+            </a:r>
+          </a:p>
+          <a:p>
+            <a:pPr lvl="2"/>
+            <a:r>
+              <a:t>Use of post and pre-increment operator </a:t>
+            </a:r>
+          </a:p>
+          <a:p>
+            <a:pPr lvl="1"/>
+            <a:r>
               <a:t>Prime factors</a:t>
             </a:r>
           </a:p>
@@ -14265,30 +14567,6 @@
             <a:pPr lvl="1"/>
             <a:r>
               <a:t>Ramaujan number computation</a:t>
-            </a:r>
-          </a:p>
-          <a:p>
-            <a:pPr lvl="1"/>
-            <a:r>
-              <a:t>Analysis of programs </a:t>
-            </a:r>
-          </a:p>
-          <a:p>
-            <a:pPr lvl="2"/>
-            <a:r>
-              <a:t>Count number of digits</a:t>
-            </a:r>
-          </a:p>
-          <a:p>
-            <a:pPr lvl="2"/>
-            <a:r>
-              <a:t>Reverse the digits</a:t>
-            </a:r>
-          </a:p>
-          <a:p>
-            <a:pPr lvl="2"/>
-            <a:r>
-              <a:t>Use of post and pre-increment operator</a:t>
             </a:r>
           </a:p>
         </p:txBody>
@@ -15062,7 +15340,7 @@
           <a:p>
             <a:pPr lvl="1"/>
             <a:r>
-              <a:t>There is confusion on how it should be executed</a:t>
+              <a:t>There is no confusion on how it should be executed</a:t>
             </a:r>
           </a:p>
           <a:p>
@@ -15074,7 +15352,14 @@
           <a:p>
             <a:pPr/>
             <a:r>
-              <a:t>These are attributes of algorithm</a:t>
+              <a:t>These are </a:t>
+            </a:r>
+            <a:r>
+              <a:rPr b="1"/>
+              <a:t>attributes</a:t>
+            </a:r>
+            <a:r>
+              <a:t> of algorithm</a:t>
             </a:r>
           </a:p>
         </p:txBody>
@@ -15852,45 +16137,67 @@
             </a:r>
           </a:p>
           <a:p>
+            <a:pPr lvl="1">
+              <a:defRPr i="1" u="sng"/>
+            </a:pPr>
+            <a:r>
+              <a:t>An algorithm is a sequence of unambiguous instructions for solving a problem, i.e. for obtaining a required output for any legitimate input in a finite amount of time.</a:t>
+            </a:r>
+          </a:p>
+          <a:p>
+            <a:pPr/>
+            <a:r>
+              <a:t>Algorithm must satisfy following criteria</a:t>
+            </a:r>
+          </a:p>
+          <a:p>
             <a:pPr lvl="1"/>
             <a:r>
-              <a:t>An algorithm is a sequence of unambiguous instructions for solving a problem, i.e. for obtaining a required output for any legitimate input in a finite amount of time.</a:t>
-            </a:r>
-          </a:p>
-          <a:p>
-            <a:pPr/>
-            <a:r>
-              <a:t>Algorithm must satisfy following criteria</a:t>
+              <a:rPr b="1"/>
+              <a:t>Input</a:t>
+            </a:r>
+            <a:r>
+              <a:t> : zero or more input</a:t>
             </a:r>
           </a:p>
           <a:p>
             <a:pPr lvl="1"/>
             <a:r>
-              <a:t>Input : zero or more input</a:t>
+              <a:rPr b="1"/>
+              <a:t>Outout</a:t>
+            </a:r>
+            <a:r>
+              <a:t>: At least one output is produced</a:t>
             </a:r>
           </a:p>
           <a:p>
             <a:pPr lvl="1"/>
             <a:r>
-              <a:t>Outout: At least one output is produced</a:t>
+              <a:rPr b="1"/>
+              <a:t>Definite</a:t>
+            </a:r>
+            <a:r>
+              <a:t> : unambiguity</a:t>
             </a:r>
           </a:p>
           <a:p>
             <a:pPr lvl="1"/>
             <a:r>
-              <a:t>Definite : unambiguity</a:t>
+              <a:rPr b="1"/>
+              <a:t>Finite</a:t>
+            </a:r>
+            <a:r>
+              <a:t>: termination</a:t>
             </a:r>
           </a:p>
           <a:p>
             <a:pPr lvl="1"/>
             <a:r>
-              <a:t>Finite: termination</a:t>
-            </a:r>
-          </a:p>
-          <a:p>
-            <a:pPr lvl="1"/>
-            <a:r>
-              <a:t>Effectiveness: Feasible to execute</a:t>
+              <a:rPr b="1"/>
+              <a:t>Effectiveness</a:t>
+            </a:r>
+            <a:r>
+              <a:t>: Feasible to execute</a:t>
             </a:r>
           </a:p>
         </p:txBody>
@@ -16669,8 +16976,8 @@
           </p:nvSpPr>
           <p:spPr>
             <a:xfrm>
-              <a:off x="539422" y="164223"/>
-              <a:ext cx="1664356" cy="433554"/>
+              <a:off x="320992" y="108962"/>
+              <a:ext cx="2101216" cy="544076"/>
             </a:xfrm>
             <a:prstGeom prst="rect">
               <a:avLst/>
@@ -16693,7 +17000,7 @@
             </a:bodyPr>
             <a:lstStyle>
               <a:lvl1pPr marL="0" marR="0" algn="ctr">
-                <a:defRPr sz="2500">
+                <a:defRPr sz="3200">
                   <a:solidFill>
                     <a:srgbClr val="001932"/>
                   </a:solidFill>
@@ -16791,7 +17098,7 @@
         <p:spPr>
           <a:xfrm>
             <a:off x="4007379" y="1430866"/>
-            <a:ext cx="1284288" cy="421393"/>
+            <a:ext cx="1740562" cy="544077"/>
           </a:xfrm>
           <a:prstGeom prst="rect">
             <a:avLst/>
@@ -16811,7 +17118,7 @@
           </a:bodyPr>
           <a:lstStyle>
             <a:lvl1pPr marL="0" marR="0">
-              <a:defRPr sz="2400">
+              <a:defRPr sz="3200">
                 <a:solidFill>
                   <a:srgbClr val="001932"/>
                 </a:solidFill>
@@ -16836,7 +17143,7 @@
         <p:spPr>
           <a:xfrm>
             <a:off x="3999441" y="2573866"/>
-            <a:ext cx="1289259" cy="421393"/>
+            <a:ext cx="1684299" cy="544077"/>
           </a:xfrm>
           <a:prstGeom prst="rect">
             <a:avLst/>
@@ -16856,7 +17163,7 @@
           </a:bodyPr>
           <a:lstStyle>
             <a:lvl1pPr marL="0" marR="0">
-              <a:defRPr sz="2400">
+              <a:defRPr sz="3200">
                 <a:solidFill>
                   <a:srgbClr val="001932"/>
                 </a:solidFill>
@@ -16881,7 +17188,7 @@
         <p:spPr>
           <a:xfrm>
             <a:off x="948266" y="3793066"/>
-            <a:ext cx="1198564" cy="458414"/>
+            <a:ext cx="1198564" cy="544077"/>
           </a:xfrm>
           <a:prstGeom prst="rect">
             <a:avLst/>
@@ -16901,7 +17208,7 @@
           </a:bodyPr>
           <a:lstStyle>
             <a:lvl1pPr marL="0" marR="0">
-              <a:defRPr sz="2600">
+              <a:defRPr sz="3200">
                 <a:solidFill>
                   <a:srgbClr val="001932"/>
                 </a:solidFill>
@@ -16925,8 +17232,8 @@
         </p:nvSpPr>
         <p:spPr>
           <a:xfrm>
-            <a:off x="7044266" y="3793066"/>
-            <a:ext cx="1198564" cy="433553"/>
+            <a:off x="7288733" y="3881090"/>
+            <a:ext cx="1198563" cy="544077"/>
           </a:xfrm>
           <a:prstGeom prst="rect">
             <a:avLst/>
@@ -16946,7 +17253,7 @@
           </a:bodyPr>
           <a:lstStyle>
             <a:lvl1pPr marL="0" marR="0">
-              <a:defRPr sz="2500">
+              <a:defRPr sz="3200">
                 <a:solidFill>
                   <a:srgbClr val="001932"/>
                 </a:solidFill>
@@ -17040,6 +17347,398 @@
     <a:masterClrMapping/>
   </p:clrMapOvr>
   <p:transition xmlns:p14="http://schemas.microsoft.com/office/powerpoint/2010/main" spd="med" advClick="1"/>
+  <p:timing>
+    <p:tnLst>
+      <p:par>
+        <p:cTn id="1" nodeType="tmRoot" restart="never" dur="indefinite" fill="hold">
+          <p:childTnLst>
+            <p:seq concurrent="1" prevAc="none" nextAc="seek">
+              <p:cTn id="2" nodeType="mainSeq" dur="indefinite" fill="hold">
+                <p:childTnLst>
+                  <p:par>
+                    <p:cTn id="3" fill="hold">
+                      <p:stCondLst>
+                        <p:cond delay="indefinite"/>
+                      </p:stCondLst>
+                      <p:childTnLst>
+                        <p:par>
+                          <p:cTn id="4" fill="hold">
+                            <p:stCondLst>
+                              <p:cond delay="0"/>
+                            </p:stCondLst>
+                            <p:childTnLst>
+                              <p:par>
+                                <p:cTn id="5" presetClass="entr" nodeType="clickEffect" presetSubtype="0" presetID="1" grpId="1" fill="hold">
+                                  <p:stCondLst>
+                                    <p:cond delay="0"/>
+                                  </p:stCondLst>
+                                  <p:iterate type="el" backwards="0">
+                                    <p:tmAbs val="0"/>
+                                  </p:iterate>
+                                  <p:childTnLst>
+                                    <p:set>
+                                      <p:cBhvr>
+                                        <p:cTn id="6" fill="hold"/>
+                                        <p:tgtEl>
+                                          <p:spTgt spid="71"/>
+                                        </p:tgtEl>
+                                        <p:attrNameLst>
+                                          <p:attrName>style.visibility</p:attrName>
+                                        </p:attrNameLst>
+                                      </p:cBhvr>
+                                      <p:to>
+                                        <p:strVal val="visible"/>
+                                      </p:to>
+                                    </p:set>
+                                  </p:childTnLst>
+                                </p:cTn>
+                              </p:par>
+                            </p:childTnLst>
+                          </p:cTn>
+                        </p:par>
+                      </p:childTnLst>
+                    </p:cTn>
+                  </p:par>
+                  <p:par>
+                    <p:cTn id="7" fill="hold">
+                      <p:stCondLst>
+                        <p:cond delay="indefinite"/>
+                      </p:stCondLst>
+                      <p:childTnLst>
+                        <p:par>
+                          <p:cTn id="8" fill="hold">
+                            <p:stCondLst>
+                              <p:cond delay="0"/>
+                            </p:stCondLst>
+                            <p:childTnLst>
+                              <p:par>
+                                <p:cTn id="9" presetClass="entr" nodeType="clickEffect" presetSubtype="0" presetID="1" grpId="2" fill="hold">
+                                  <p:stCondLst>
+                                    <p:cond delay="0"/>
+                                  </p:stCondLst>
+                                  <p:iterate type="el" backwards="0">
+                                    <p:tmAbs val="0"/>
+                                  </p:iterate>
+                                  <p:childTnLst>
+                                    <p:set>
+                                      <p:cBhvr>
+                                        <p:cTn id="10" fill="hold"/>
+                                        <p:tgtEl>
+                                          <p:spTgt spid="69"/>
+                                        </p:tgtEl>
+                                        <p:attrNameLst>
+                                          <p:attrName>style.visibility</p:attrName>
+                                        </p:attrNameLst>
+                                      </p:cBhvr>
+                                      <p:to>
+                                        <p:strVal val="visible"/>
+                                      </p:to>
+                                    </p:set>
+                                  </p:childTnLst>
+                                </p:cTn>
+                              </p:par>
+                            </p:childTnLst>
+                          </p:cTn>
+                        </p:par>
+                      </p:childTnLst>
+                    </p:cTn>
+                  </p:par>
+                  <p:par>
+                    <p:cTn id="11" fill="hold">
+                      <p:stCondLst>
+                        <p:cond delay="indefinite"/>
+                      </p:stCondLst>
+                      <p:childTnLst>
+                        <p:par>
+                          <p:cTn id="12" fill="hold">
+                            <p:stCondLst>
+                              <p:cond delay="0"/>
+                            </p:stCondLst>
+                            <p:childTnLst>
+                              <p:par>
+                                <p:cTn id="13" presetClass="entr" nodeType="clickEffect" presetSubtype="0" presetID="1" grpId="3" fill="hold">
+                                  <p:stCondLst>
+                                    <p:cond delay="0"/>
+                                  </p:stCondLst>
+                                  <p:iterate type="el" backwards="0">
+                                    <p:tmAbs val="0"/>
+                                  </p:iterate>
+                                  <p:childTnLst>
+                                    <p:set>
+                                      <p:cBhvr>
+                                        <p:cTn id="14" fill="hold"/>
+                                        <p:tgtEl>
+                                          <p:spTgt spid="72"/>
+                                        </p:tgtEl>
+                                        <p:attrNameLst>
+                                          <p:attrName>style.visibility</p:attrName>
+                                        </p:attrNameLst>
+                                      </p:cBhvr>
+                                      <p:to>
+                                        <p:strVal val="visible"/>
+                                      </p:to>
+                                    </p:set>
+                                  </p:childTnLst>
+                                </p:cTn>
+                              </p:par>
+                            </p:childTnLst>
+                          </p:cTn>
+                        </p:par>
+                      </p:childTnLst>
+                    </p:cTn>
+                  </p:par>
+                  <p:par>
+                    <p:cTn id="15" fill="hold">
+                      <p:stCondLst>
+                        <p:cond delay="indefinite"/>
+                      </p:stCondLst>
+                      <p:childTnLst>
+                        <p:par>
+                          <p:cTn id="16" fill="hold">
+                            <p:stCondLst>
+                              <p:cond delay="0"/>
+                            </p:stCondLst>
+                            <p:childTnLst>
+                              <p:par>
+                                <p:cTn id="17" presetClass="entr" nodeType="clickEffect" presetSubtype="0" presetID="1" grpId="4" fill="hold">
+                                  <p:stCondLst>
+                                    <p:cond delay="0"/>
+                                  </p:stCondLst>
+                                  <p:iterate type="el" backwards="0">
+                                    <p:tmAbs val="0"/>
+                                  </p:iterate>
+                                  <p:childTnLst>
+                                    <p:set>
+                                      <p:cBhvr>
+                                        <p:cTn id="18" fill="hold"/>
+                                        <p:tgtEl>
+                                          <p:spTgt spid="70"/>
+                                        </p:tgtEl>
+                                        <p:attrNameLst>
+                                          <p:attrName>style.visibility</p:attrName>
+                                        </p:attrNameLst>
+                                      </p:cBhvr>
+                                      <p:to>
+                                        <p:strVal val="visible"/>
+                                      </p:to>
+                                    </p:set>
+                                  </p:childTnLst>
+                                </p:cTn>
+                              </p:par>
+                            </p:childTnLst>
+                          </p:cTn>
+                        </p:par>
+                      </p:childTnLst>
+                    </p:cTn>
+                  </p:par>
+                  <p:par>
+                    <p:cTn id="19" fill="hold">
+                      <p:stCondLst>
+                        <p:cond delay="indefinite"/>
+                      </p:stCondLst>
+                      <p:childTnLst>
+                        <p:par>
+                          <p:cTn id="20" fill="hold">
+                            <p:stCondLst>
+                              <p:cond delay="0"/>
+                            </p:stCondLst>
+                            <p:childTnLst>
+                              <p:par>
+                                <p:cTn id="21" presetClass="entr" nodeType="clickEffect" presetSubtype="0" presetID="1" grpId="5" fill="hold">
+                                  <p:stCondLst>
+                                    <p:cond delay="0"/>
+                                  </p:stCondLst>
+                                  <p:iterate type="el" backwards="0">
+                                    <p:tmAbs val="0"/>
+                                  </p:iterate>
+                                  <p:childTnLst>
+                                    <p:set>
+                                      <p:cBhvr>
+                                        <p:cTn id="22" fill="hold"/>
+                                        <p:tgtEl>
+                                          <p:spTgt spid="73"/>
+                                        </p:tgtEl>
+                                        <p:attrNameLst>
+                                          <p:attrName>style.visibility</p:attrName>
+                                        </p:attrNameLst>
+                                      </p:cBhvr>
+                                      <p:to>
+                                        <p:strVal val="visible"/>
+                                      </p:to>
+                                    </p:set>
+                                  </p:childTnLst>
+                                </p:cTn>
+                              </p:par>
+                            </p:childTnLst>
+                          </p:cTn>
+                        </p:par>
+                      </p:childTnLst>
+                    </p:cTn>
+                  </p:par>
+                  <p:par>
+                    <p:cTn id="23" fill="hold">
+                      <p:stCondLst>
+                        <p:cond delay="indefinite"/>
+                      </p:stCondLst>
+                      <p:childTnLst>
+                        <p:par>
+                          <p:cTn id="24" fill="hold">
+                            <p:stCondLst>
+                              <p:cond delay="0"/>
+                            </p:stCondLst>
+                            <p:childTnLst>
+                              <p:par>
+                                <p:cTn id="25" presetClass="entr" nodeType="clickEffect" presetSubtype="0" presetID="1" grpId="6" fill="hold">
+                                  <p:stCondLst>
+                                    <p:cond delay="0"/>
+                                  </p:stCondLst>
+                                  <p:iterate type="el" backwards="0">
+                                    <p:tmAbs val="0"/>
+                                  </p:iterate>
+                                  <p:childTnLst>
+                                    <p:set>
+                                      <p:cBhvr>
+                                        <p:cTn id="26" fill="hold"/>
+                                        <p:tgtEl>
+                                          <p:spTgt spid="75"/>
+                                        </p:tgtEl>
+                                        <p:attrNameLst>
+                                          <p:attrName>style.visibility</p:attrName>
+                                        </p:attrNameLst>
+                                      </p:cBhvr>
+                                      <p:to>
+                                        <p:strVal val="visible"/>
+                                      </p:to>
+                                    </p:set>
+                                  </p:childTnLst>
+                                </p:cTn>
+                              </p:par>
+                            </p:childTnLst>
+                          </p:cTn>
+                        </p:par>
+                      </p:childTnLst>
+                    </p:cTn>
+                  </p:par>
+                  <p:par>
+                    <p:cTn id="27" fill="hold">
+                      <p:stCondLst>
+                        <p:cond delay="indefinite"/>
+                      </p:stCondLst>
+                      <p:childTnLst>
+                        <p:par>
+                          <p:cTn id="28" fill="hold">
+                            <p:stCondLst>
+                              <p:cond delay="0"/>
+                            </p:stCondLst>
+                            <p:childTnLst>
+                              <p:par>
+                                <p:cTn id="29" presetClass="entr" nodeType="clickEffect" presetSubtype="0" presetID="1" grpId="7" fill="hold">
+                                  <p:stCondLst>
+                                    <p:cond delay="0"/>
+                                  </p:stCondLst>
+                                  <p:iterate type="el" backwards="0">
+                                    <p:tmAbs val="0"/>
+                                  </p:iterate>
+                                  <p:childTnLst>
+                                    <p:set>
+                                      <p:cBhvr>
+                                        <p:cTn id="30" fill="hold"/>
+                                        <p:tgtEl>
+                                          <p:spTgt spid="76"/>
+                                        </p:tgtEl>
+                                        <p:attrNameLst>
+                                          <p:attrName>style.visibility</p:attrName>
+                                        </p:attrNameLst>
+                                      </p:cBhvr>
+                                      <p:to>
+                                        <p:strVal val="visible"/>
+                                      </p:to>
+                                    </p:set>
+                                  </p:childTnLst>
+                                </p:cTn>
+                              </p:par>
+                            </p:childTnLst>
+                          </p:cTn>
+                        </p:par>
+                      </p:childTnLst>
+                    </p:cTn>
+                  </p:par>
+                  <p:par>
+                    <p:cTn id="31" fill="hold">
+                      <p:stCondLst>
+                        <p:cond delay="indefinite"/>
+                      </p:stCondLst>
+                      <p:childTnLst>
+                        <p:par>
+                          <p:cTn id="32" fill="hold">
+                            <p:stCondLst>
+                              <p:cond delay="0"/>
+                            </p:stCondLst>
+                            <p:childTnLst>
+                              <p:par>
+                                <p:cTn id="33" presetClass="entr" nodeType="clickEffect" presetSubtype="0" presetID="1" grpId="8" fill="hold">
+                                  <p:stCondLst>
+                                    <p:cond delay="0"/>
+                                  </p:stCondLst>
+                                  <p:iterate type="el" backwards="0">
+                                    <p:tmAbs val="0"/>
+                                  </p:iterate>
+                                  <p:childTnLst>
+                                    <p:set>
+                                      <p:cBhvr>
+                                        <p:cTn id="34" fill="hold"/>
+                                        <p:tgtEl>
+                                          <p:spTgt spid="74"/>
+                                        </p:tgtEl>
+                                        <p:attrNameLst>
+                                          <p:attrName>style.visibility</p:attrName>
+                                        </p:attrNameLst>
+                                      </p:cBhvr>
+                                      <p:to>
+                                        <p:strVal val="visible"/>
+                                      </p:to>
+                                    </p:set>
+                                  </p:childTnLst>
+                                </p:cTn>
+                              </p:par>
+                            </p:childTnLst>
+                          </p:cTn>
+                        </p:par>
+                      </p:childTnLst>
+                    </p:cTn>
+                  </p:par>
+                </p:childTnLst>
+              </p:cTn>
+              <p:prevCondLst>
+                <p:cond evt="onPrev">
+                  <p:tgtEl>
+                    <p:sldTgt/>
+                  </p:tgtEl>
+                </p:cond>
+              </p:prevCondLst>
+              <p:nextCondLst>
+                <p:cond evt="onNext">
+                  <p:tgtEl>
+                    <p:sldTgt/>
+                  </p:tgtEl>
+                </p:cond>
+              </p:nextCondLst>
+            </p:seq>
+          </p:childTnLst>
+        </p:cTn>
+      </p:par>
+    </p:tnLst>
+    <p:bldLst>
+      <p:bldP build="whole" bldLvl="1" animBg="1" rev="0" advAuto="0" spid="71" grpId="1"/>
+      <p:bldP build="whole" bldLvl="1" animBg="1" rev="0" advAuto="0" spid="70" grpId="4"/>
+      <p:bldP build="whole" bldLvl="1" animBg="1" rev="0" advAuto="0" spid="73" grpId="5"/>
+      <p:bldP build="whole" bldLvl="1" animBg="1" rev="0" advAuto="0" spid="76" grpId="7"/>
+      <p:bldP build="whole" bldLvl="1" animBg="1" rev="0" advAuto="0" spid="74" grpId="8"/>
+      <p:bldP build="whole" bldLvl="1" animBg="1" rev="0" advAuto="0" spid="69" grpId="2"/>
+      <p:bldP build="whole" bldLvl="1" animBg="1" rev="0" advAuto="0" spid="75" grpId="6"/>
+      <p:bldP build="whole" bldLvl="1" animBg="1" rev="0" advAuto="0" spid="72" grpId="3"/>
+    </p:bldLst>
+  </p:timing>
 </p:sld>
 </file>
 
@@ -17134,22 +17833,10 @@
                 <a:cs typeface="Arial"/>
                 <a:sym typeface="Arial"/>
               </a:rPr>
-              <a:t>100</a:t>
-            </a:r>
-            <a:r>
-              <a:t> or </a:t>
-            </a:r>
-            <a:r>
-              <a:rPr>
-                <a:latin typeface="Arial"/>
-                <a:ea typeface="Arial"/>
-                <a:cs typeface="Arial"/>
-                <a:sym typeface="Arial"/>
-              </a:rPr>
-              <a:t>200</a:t>
-            </a:r>
-            <a:r>
-              <a:t> rupees from ATM/Bank</a:t>
+              <a:t>some money</a:t>
+            </a:r>
+            <a:r>
+              <a:t> from ATM/Bank</a:t>
             </a:r>
           </a:p>
           <a:p>
@@ -18043,7 +18730,25 @@
           <a:p>
             <a:pPr/>
             <a:r>
-              <a:t>Data structure is concerned with representation and manipulation of data</a:t>
+              <a:t>Data structure is concerned with following for data</a:t>
+            </a:r>
+          </a:p>
+          <a:p>
+            <a:pPr lvl="1"/>
+            <a:r>
+              <a:t>Representation </a:t>
+            </a:r>
+          </a:p>
+          <a:p>
+            <a:pPr lvl="1"/>
+            <a:r>
+              <a:t>Organization</a:t>
+            </a:r>
+          </a:p>
+          <a:p>
+            <a:pPr lvl="1"/>
+            <a:r>
+              <a:t>Manipulation</a:t>
             </a:r>
           </a:p>
           <a:p>
@@ -18064,7 +18769,7 @@
                 <a:cs typeface="Courier New"/>
                 <a:sym typeface="Courier New"/>
               </a:rPr>
-              <a:t>Data Strcutures</a:t>
+              <a:t>Data Structures</a:t>
             </a:r>
             <a:r>
               <a:t> and </a:t>
@@ -18425,6 +19130,150 @@
                       </p:childTnLst>
                     </p:cTn>
                   </p:par>
+                  <p:par>
+                    <p:cTn id="21" fill="hold">
+                      <p:stCondLst>
+                        <p:cond delay="indefinite"/>
+                      </p:stCondLst>
+                      <p:childTnLst>
+                        <p:par>
+                          <p:cTn id="22" fill="hold">
+                            <p:stCondLst>
+                              <p:cond delay="0"/>
+                            </p:stCondLst>
+                            <p:childTnLst>
+                              <p:par>
+                                <p:cTn id="23" presetClass="entr" nodeType="clickEffect" presetSubtype="0" presetID="1" grpId="1" fill="hold">
+                                  <p:stCondLst>
+                                    <p:cond delay="0"/>
+                                  </p:stCondLst>
+                                  <p:iterate type="el" backwards="0">
+                                    <p:tmAbs val="0"/>
+                                  </p:iterate>
+                                  <p:childTnLst>
+                                    <p:set>
+                                      <p:cBhvr>
+                                        <p:cTn id="24" fill="hold"/>
+                                        <p:tgtEl>
+                                          <p:spTgt spid="85">
+                                            <p:txEl>
+                                              <p:pRg st="4" end="4"/>
+                                            </p:txEl>
+                                          </p:spTgt>
+                                        </p:tgtEl>
+                                        <p:attrNameLst>
+                                          <p:attrName>style.visibility</p:attrName>
+                                        </p:attrNameLst>
+                                      </p:cBhvr>
+                                      <p:to>
+                                        <p:strVal val="visible"/>
+                                      </p:to>
+                                    </p:set>
+                                  </p:childTnLst>
+                                </p:cTn>
+                              </p:par>
+                            </p:childTnLst>
+                          </p:cTn>
+                        </p:par>
+                      </p:childTnLst>
+                    </p:cTn>
+                  </p:par>
+                  <p:par>
+                    <p:cTn id="25" fill="hold">
+                      <p:stCondLst>
+                        <p:cond delay="indefinite"/>
+                      </p:stCondLst>
+                      <p:childTnLst>
+                        <p:par>
+                          <p:cTn id="26" fill="hold">
+                            <p:stCondLst>
+                              <p:cond delay="0"/>
+                            </p:stCondLst>
+                            <p:childTnLst>
+                              <p:par>
+                                <p:cTn id="27" presetClass="entr" nodeType="clickEffect" presetSubtype="0" presetID="1" grpId="1" fill="hold">
+                                  <p:stCondLst>
+                                    <p:cond delay="0"/>
+                                  </p:stCondLst>
+                                  <p:iterate type="el" backwards="0">
+                                    <p:tmAbs val="0"/>
+                                  </p:iterate>
+                                  <p:childTnLst>
+                                    <p:set>
+                                      <p:cBhvr>
+                                        <p:cTn id="28" fill="hold"/>
+                                        <p:tgtEl>
+                                          <p:spTgt spid="85">
+                                            <p:txEl>
+                                              <p:pRg st="5" end="5"/>
+                                            </p:txEl>
+                                          </p:spTgt>
+                                        </p:tgtEl>
+                                        <p:attrNameLst>
+                                          <p:attrName>style.visibility</p:attrName>
+                                        </p:attrNameLst>
+                                      </p:cBhvr>
+                                      <p:to>
+                                        <p:strVal val="visible"/>
+                                      </p:to>
+                                    </p:set>
+                                  </p:childTnLst>
+                                </p:cTn>
+                              </p:par>
+                            </p:childTnLst>
+                          </p:cTn>
+                        </p:par>
+                      </p:childTnLst>
+                    </p:cTn>
+                  </p:par>
+                  <p:par>
+                    <p:cTn id="29" fill="hold">
+                      <p:stCondLst>
+                        <p:cond delay="indefinite"/>
+                      </p:stCondLst>
+                      <p:childTnLst>
+                        <p:par>
+                          <p:cTn id="30" fill="hold">
+                            <p:stCondLst>
+                              <p:cond delay="0"/>
+                            </p:stCondLst>
+                            <p:childTnLst>
+                              <p:par>
+                                <p:cTn id="31" presetClass="entr" nodeType="clickEffect" presetSubtype="0" presetID="1" grpId="1" fill="hold">
+                                  <p:stCondLst>
+                                    <p:cond delay="0"/>
+                                  </p:stCondLst>
+                                  <p:iterate type="el" backwards="0">
+                                    <p:tmAbs val="0"/>
+                                  </p:iterate>
+                                  <p:childTnLst>
+                                    <p:set>
+                                      <p:cBhvr>
+                                        <p:cTn id="32" fill="hold"/>
+                                        <p:tgtEl>
+                                          <p:spTgt spid="85">
+                                            <p:txEl>
+                                              <p:pRg st="6" end="6"/>
+                                            </p:txEl>
+                                          </p:spTgt>
+                                        </p:tgtEl>
+                                        <p:attrNameLst>
+                                          <p:attrName>style.visibility</p:attrName>
+                                        </p:attrNameLst>
+                                      </p:cBhvr>
+                                      <p:to>
+                                        <p:strVal val="visible"/>
+                                      </p:to>
+                                    </p:set>
+                                  </p:childTnLst>
+                                </p:cTn>
+                              </p:par>
+                            </p:childTnLst>
+                          </p:cTn>
+                        </p:par>
+                      </p:childTnLst>
+                    </p:cTn>
+                  </p:par>
                 </p:childTnLst>
               </p:cTn>
               <p:prevCondLst>
@@ -18496,7 +19345,7 @@
       </p:sp>
       <p:sp>
         <p:nvSpPr>
-          <p:cNvPr id="91" name="How do design algorithms…"/>
+          <p:cNvPr id="91" name="How to design algorithms…"/>
           <p:cNvSpPr txBox="1"/>
           <p:nvPr>
             <p:ph type="body" idx="1"/>
@@ -18521,7 +19370,7 @@
               </a:spcBef>
             </a:pPr>
             <a:r>
-              <a:t>How do </a:t>
+              <a:t>How to </a:t>
             </a:r>
             <a:r>
               <a:rPr b="1"/>

</xml_diff>